<commit_message>
chore: Update matplotlib configuration and remove unused files
</commit_message>
<xml_diff>
--- a/slides/reunión_27_07_2024.pptx
+++ b/slides/reunión_27_07_2024.pptx
@@ -4,10 +4,21 @@
   <p:sldMasterIdLst>
     <p:sldMasterId id="2147483648" r:id="rId1"/>
   </p:sldMasterIdLst>
+  <p:notesMasterIdLst>
+    <p:notesMasterId r:id="rId13"/>
+  </p:notesMasterIdLst>
   <p:sldIdLst>
     <p:sldId id="256" r:id="rId2"/>
-    <p:sldId id="257" r:id="rId3"/>
-    <p:sldId id="258" r:id="rId4"/>
+    <p:sldId id="258" r:id="rId3"/>
+    <p:sldId id="261" r:id="rId4"/>
+    <p:sldId id="262" r:id="rId5"/>
+    <p:sldId id="263" r:id="rId6"/>
+    <p:sldId id="259" r:id="rId7"/>
+    <p:sldId id="266" r:id="rId8"/>
+    <p:sldId id="268" r:id="rId9"/>
+    <p:sldId id="267" r:id="rId10"/>
+    <p:sldId id="260" r:id="rId11"/>
+    <p:sldId id="265" r:id="rId12"/>
   </p:sldIdLst>
   <p:sldSz cx="12192000" cy="6858000"/>
   <p:notesSz cx="6858000" cy="9144000"/>
@@ -106,7 +117,698 @@
       </a:defRPr>
     </a:lvl9pPr>
   </p:defaultTextStyle>
+  <p:extLst>
+    <p:ext uri="{EFAFB233-063F-42B5-8137-9DF3F51BA10A}">
+      <p15:sldGuideLst xmlns:p15="http://schemas.microsoft.com/office/powerpoint/2012/main"/>
+    </p:ext>
+  </p:extLst>
 </p:presentation>
+</file>
+
+<file path=ppt/notesMasters/notesMaster1.xml><?xml version="1.0" encoding="utf-8"?>
+<p:notesMaster xmlns:a="http://schemas.openxmlformats.org/drawingml/2006/main" xmlns:r="http://schemas.openxmlformats.org/officeDocument/2006/relationships" xmlns:p="http://schemas.openxmlformats.org/presentationml/2006/main">
+  <p:cSld>
+    <p:bg>
+      <p:bgRef idx="1001">
+        <a:schemeClr val="bg1"/>
+      </p:bgRef>
+    </p:bg>
+    <p:spTree>
+      <p:nvGrpSpPr>
+        <p:cNvPr id="1" name=""/>
+        <p:cNvGrpSpPr/>
+        <p:nvPr/>
+      </p:nvGrpSpPr>
+      <p:grpSpPr>
+        <a:xfrm>
+          <a:off x="0" y="0"/>
+          <a:ext cx="0" cy="0"/>
+          <a:chOff x="0" y="0"/>
+          <a:chExt cx="0" cy="0"/>
+        </a:xfrm>
+      </p:grpSpPr>
+      <p:sp>
+        <p:nvSpPr>
+          <p:cNvPr id="2" name="Marcador de encabezado 1"/>
+          <p:cNvSpPr>
+            <a:spLocks noGrp="1"/>
+          </p:cNvSpPr>
+          <p:nvPr>
+            <p:ph type="hdr" sz="quarter"/>
+          </p:nvPr>
+        </p:nvSpPr>
+        <p:spPr>
+          <a:xfrm>
+            <a:off x="0" y="0"/>
+            <a:ext cx="2971800" cy="458788"/>
+          </a:xfrm>
+          <a:prstGeom prst="rect">
+            <a:avLst/>
+          </a:prstGeom>
+        </p:spPr>
+        <p:txBody>
+          <a:bodyPr vert="horz" lIns="91440" tIns="45720" rIns="91440" bIns="45720" rtlCol="0"/>
+          <a:lstStyle>
+            <a:lvl1pPr algn="l">
+              <a:defRPr sz="1200"/>
+            </a:lvl1pPr>
+          </a:lstStyle>
+          <a:p>
+            <a:endParaRPr lang="es-CO"/>
+          </a:p>
+        </p:txBody>
+      </p:sp>
+      <p:sp>
+        <p:nvSpPr>
+          <p:cNvPr id="3" name="Marcador de fecha 2"/>
+          <p:cNvSpPr>
+            <a:spLocks noGrp="1"/>
+          </p:cNvSpPr>
+          <p:nvPr>
+            <p:ph type="dt" idx="1"/>
+          </p:nvPr>
+        </p:nvSpPr>
+        <p:spPr>
+          <a:xfrm>
+            <a:off x="3884613" y="0"/>
+            <a:ext cx="2971800" cy="458788"/>
+          </a:xfrm>
+          <a:prstGeom prst="rect">
+            <a:avLst/>
+          </a:prstGeom>
+        </p:spPr>
+        <p:txBody>
+          <a:bodyPr vert="horz" lIns="91440" tIns="45720" rIns="91440" bIns="45720" rtlCol="0"/>
+          <a:lstStyle>
+            <a:lvl1pPr algn="r">
+              <a:defRPr sz="1200"/>
+            </a:lvl1pPr>
+          </a:lstStyle>
+          <a:p>
+            <a:fld id="{69C27F49-51D1-454D-A7B1-9FD3EAB0CF1E}" type="datetimeFigureOut">
+              <a:rPr lang="es-CO" smtClean="0"/>
+              <a:t>27/07/2024</a:t>
+            </a:fld>
+            <a:endParaRPr lang="es-CO"/>
+          </a:p>
+        </p:txBody>
+      </p:sp>
+      <p:sp>
+        <p:nvSpPr>
+          <p:cNvPr id="4" name="Marcador de imagen de diapositiva 3"/>
+          <p:cNvSpPr>
+            <a:spLocks noGrp="1" noRot="1" noChangeAspect="1"/>
+          </p:cNvSpPr>
+          <p:nvPr>
+            <p:ph type="sldImg" idx="2"/>
+          </p:nvPr>
+        </p:nvSpPr>
+        <p:spPr>
+          <a:xfrm>
+            <a:off x="685800" y="1143000"/>
+            <a:ext cx="5486400" cy="3086100"/>
+          </a:xfrm>
+          <a:prstGeom prst="rect">
+            <a:avLst/>
+          </a:prstGeom>
+          <a:noFill/>
+          <a:ln w="12700">
+            <a:solidFill>
+              <a:prstClr val="black"/>
+            </a:solidFill>
+          </a:ln>
+        </p:spPr>
+        <p:txBody>
+          <a:bodyPr vert="horz" lIns="91440" tIns="45720" rIns="91440" bIns="45720" rtlCol="0" anchor="ctr"/>
+          <a:lstStyle/>
+          <a:p>
+            <a:endParaRPr lang="es-CO"/>
+          </a:p>
+        </p:txBody>
+      </p:sp>
+      <p:sp>
+        <p:nvSpPr>
+          <p:cNvPr id="5" name="Marcador de notas 4"/>
+          <p:cNvSpPr>
+            <a:spLocks noGrp="1"/>
+          </p:cNvSpPr>
+          <p:nvPr>
+            <p:ph type="body" sz="quarter" idx="3"/>
+          </p:nvPr>
+        </p:nvSpPr>
+        <p:spPr>
+          <a:xfrm>
+            <a:off x="685800" y="4400550"/>
+            <a:ext cx="5486400" cy="3600450"/>
+          </a:xfrm>
+          <a:prstGeom prst="rect">
+            <a:avLst/>
+          </a:prstGeom>
+        </p:spPr>
+        <p:txBody>
+          <a:bodyPr vert="horz" lIns="91440" tIns="45720" rIns="91440" bIns="45720" rtlCol="0"/>
+          <a:lstStyle/>
+          <a:p>
+            <a:pPr lvl="0"/>
+            <a:r>
+              <a:rPr lang="es-ES"/>
+              <a:t>Haga clic para modificar los estilos de texto del patrón</a:t>
+            </a:r>
+          </a:p>
+          <a:p>
+            <a:pPr lvl="1"/>
+            <a:r>
+              <a:rPr lang="es-ES"/>
+              <a:t>Segundo nivel</a:t>
+            </a:r>
+          </a:p>
+          <a:p>
+            <a:pPr lvl="2"/>
+            <a:r>
+              <a:rPr lang="es-ES"/>
+              <a:t>Tercer nivel</a:t>
+            </a:r>
+          </a:p>
+          <a:p>
+            <a:pPr lvl="3"/>
+            <a:r>
+              <a:rPr lang="es-ES"/>
+              <a:t>Cuarto nivel</a:t>
+            </a:r>
+          </a:p>
+          <a:p>
+            <a:pPr lvl="4"/>
+            <a:r>
+              <a:rPr lang="es-ES"/>
+              <a:t>Quinto nivel</a:t>
+            </a:r>
+            <a:endParaRPr lang="es-CO"/>
+          </a:p>
+        </p:txBody>
+      </p:sp>
+      <p:sp>
+        <p:nvSpPr>
+          <p:cNvPr id="6" name="Marcador de pie de página 5"/>
+          <p:cNvSpPr>
+            <a:spLocks noGrp="1"/>
+          </p:cNvSpPr>
+          <p:nvPr>
+            <p:ph type="ftr" sz="quarter" idx="4"/>
+          </p:nvPr>
+        </p:nvSpPr>
+        <p:spPr>
+          <a:xfrm>
+            <a:off x="0" y="8685213"/>
+            <a:ext cx="2971800" cy="458787"/>
+          </a:xfrm>
+          <a:prstGeom prst="rect">
+            <a:avLst/>
+          </a:prstGeom>
+        </p:spPr>
+        <p:txBody>
+          <a:bodyPr vert="horz" lIns="91440" tIns="45720" rIns="91440" bIns="45720" rtlCol="0" anchor="b"/>
+          <a:lstStyle>
+            <a:lvl1pPr algn="l">
+              <a:defRPr sz="1200"/>
+            </a:lvl1pPr>
+          </a:lstStyle>
+          <a:p>
+            <a:endParaRPr lang="es-CO"/>
+          </a:p>
+        </p:txBody>
+      </p:sp>
+      <p:sp>
+        <p:nvSpPr>
+          <p:cNvPr id="7" name="Marcador de número de diapositiva 6"/>
+          <p:cNvSpPr>
+            <a:spLocks noGrp="1"/>
+          </p:cNvSpPr>
+          <p:nvPr>
+            <p:ph type="sldNum" sz="quarter" idx="5"/>
+          </p:nvPr>
+        </p:nvSpPr>
+        <p:spPr>
+          <a:xfrm>
+            <a:off x="3884613" y="8685213"/>
+            <a:ext cx="2971800" cy="458787"/>
+          </a:xfrm>
+          <a:prstGeom prst="rect">
+            <a:avLst/>
+          </a:prstGeom>
+        </p:spPr>
+        <p:txBody>
+          <a:bodyPr vert="horz" lIns="91440" tIns="45720" rIns="91440" bIns="45720" rtlCol="0" anchor="b"/>
+          <a:lstStyle>
+            <a:lvl1pPr algn="r">
+              <a:defRPr sz="1200"/>
+            </a:lvl1pPr>
+          </a:lstStyle>
+          <a:p>
+            <a:fld id="{E745C70F-B179-4FD5-8C48-3F5C0CA2B965}" type="slidenum">
+              <a:rPr lang="es-CO" smtClean="0"/>
+              <a:t>‹Nº›</a:t>
+            </a:fld>
+            <a:endParaRPr lang="es-CO"/>
+          </a:p>
+        </p:txBody>
+      </p:sp>
+    </p:spTree>
+    <p:extLst>
+      <p:ext uri="{BB962C8B-B14F-4D97-AF65-F5344CB8AC3E}">
+        <p14:creationId xmlns:p14="http://schemas.microsoft.com/office/powerpoint/2010/main" val="531002028"/>
+      </p:ext>
+    </p:extLst>
+  </p:cSld>
+  <p:clrMap bg1="lt1" tx1="dk1" bg2="lt2" tx2="dk2" accent1="accent1" accent2="accent2" accent3="accent3" accent4="accent4" accent5="accent5" accent6="accent6" hlink="hlink" folHlink="folHlink"/>
+  <p:notesStyle>
+    <a:lvl1pPr marL="0" algn="l" defTabSz="914400" rtl="0" eaLnBrk="1" latinLnBrk="0" hangingPunct="1">
+      <a:defRPr sz="1200" kern="1200">
+        <a:solidFill>
+          <a:schemeClr val="tx1"/>
+        </a:solidFill>
+        <a:latin typeface="+mn-lt"/>
+        <a:ea typeface="+mn-ea"/>
+        <a:cs typeface="+mn-cs"/>
+      </a:defRPr>
+    </a:lvl1pPr>
+    <a:lvl2pPr marL="457200" algn="l" defTabSz="914400" rtl="0" eaLnBrk="1" latinLnBrk="0" hangingPunct="1">
+      <a:defRPr sz="1200" kern="1200">
+        <a:solidFill>
+          <a:schemeClr val="tx1"/>
+        </a:solidFill>
+        <a:latin typeface="+mn-lt"/>
+        <a:ea typeface="+mn-ea"/>
+        <a:cs typeface="+mn-cs"/>
+      </a:defRPr>
+    </a:lvl2pPr>
+    <a:lvl3pPr marL="914400" algn="l" defTabSz="914400" rtl="0" eaLnBrk="1" latinLnBrk="0" hangingPunct="1">
+      <a:defRPr sz="1200" kern="1200">
+        <a:solidFill>
+          <a:schemeClr val="tx1"/>
+        </a:solidFill>
+        <a:latin typeface="+mn-lt"/>
+        <a:ea typeface="+mn-ea"/>
+        <a:cs typeface="+mn-cs"/>
+      </a:defRPr>
+    </a:lvl3pPr>
+    <a:lvl4pPr marL="1371600" algn="l" defTabSz="914400" rtl="0" eaLnBrk="1" latinLnBrk="0" hangingPunct="1">
+      <a:defRPr sz="1200" kern="1200">
+        <a:solidFill>
+          <a:schemeClr val="tx1"/>
+        </a:solidFill>
+        <a:latin typeface="+mn-lt"/>
+        <a:ea typeface="+mn-ea"/>
+        <a:cs typeface="+mn-cs"/>
+      </a:defRPr>
+    </a:lvl4pPr>
+    <a:lvl5pPr marL="1828800" algn="l" defTabSz="914400" rtl="0" eaLnBrk="1" latinLnBrk="0" hangingPunct="1">
+      <a:defRPr sz="1200" kern="1200">
+        <a:solidFill>
+          <a:schemeClr val="tx1"/>
+        </a:solidFill>
+        <a:latin typeface="+mn-lt"/>
+        <a:ea typeface="+mn-ea"/>
+        <a:cs typeface="+mn-cs"/>
+      </a:defRPr>
+    </a:lvl5pPr>
+    <a:lvl6pPr marL="2286000" algn="l" defTabSz="914400" rtl="0" eaLnBrk="1" latinLnBrk="0" hangingPunct="1">
+      <a:defRPr sz="1200" kern="1200">
+        <a:solidFill>
+          <a:schemeClr val="tx1"/>
+        </a:solidFill>
+        <a:latin typeface="+mn-lt"/>
+        <a:ea typeface="+mn-ea"/>
+        <a:cs typeface="+mn-cs"/>
+      </a:defRPr>
+    </a:lvl6pPr>
+    <a:lvl7pPr marL="2743200" algn="l" defTabSz="914400" rtl="0" eaLnBrk="1" latinLnBrk="0" hangingPunct="1">
+      <a:defRPr sz="1200" kern="1200">
+        <a:solidFill>
+          <a:schemeClr val="tx1"/>
+        </a:solidFill>
+        <a:latin typeface="+mn-lt"/>
+        <a:ea typeface="+mn-ea"/>
+        <a:cs typeface="+mn-cs"/>
+      </a:defRPr>
+    </a:lvl7pPr>
+    <a:lvl8pPr marL="3200400" algn="l" defTabSz="914400" rtl="0" eaLnBrk="1" latinLnBrk="0" hangingPunct="1">
+      <a:defRPr sz="1200" kern="1200">
+        <a:solidFill>
+          <a:schemeClr val="tx1"/>
+        </a:solidFill>
+        <a:latin typeface="+mn-lt"/>
+        <a:ea typeface="+mn-ea"/>
+        <a:cs typeface="+mn-cs"/>
+      </a:defRPr>
+    </a:lvl8pPr>
+    <a:lvl9pPr marL="3657600" algn="l" defTabSz="914400" rtl="0" eaLnBrk="1" latinLnBrk="0" hangingPunct="1">
+      <a:defRPr sz="1200" kern="1200">
+        <a:solidFill>
+          <a:schemeClr val="tx1"/>
+        </a:solidFill>
+        <a:latin typeface="+mn-lt"/>
+        <a:ea typeface="+mn-ea"/>
+        <a:cs typeface="+mn-cs"/>
+      </a:defRPr>
+    </a:lvl9pPr>
+  </p:notesStyle>
+</p:notesMaster>
+</file>
+
+<file path=ppt/notesSlides/notesSlide1.xml><?xml version="1.0" encoding="utf-8"?>
+<p:notes xmlns:a="http://schemas.openxmlformats.org/drawingml/2006/main" xmlns:r="http://schemas.openxmlformats.org/officeDocument/2006/relationships" xmlns:p="http://schemas.openxmlformats.org/presentationml/2006/main">
+  <p:cSld>
+    <p:spTree>
+      <p:nvGrpSpPr>
+        <p:cNvPr id="1" name=""/>
+        <p:cNvGrpSpPr/>
+        <p:nvPr/>
+      </p:nvGrpSpPr>
+      <p:grpSpPr>
+        <a:xfrm>
+          <a:off x="0" y="0"/>
+          <a:ext cx="0" cy="0"/>
+          <a:chOff x="0" y="0"/>
+          <a:chExt cx="0" cy="0"/>
+        </a:xfrm>
+      </p:grpSpPr>
+      <p:sp>
+        <p:nvSpPr>
+          <p:cNvPr id="2" name="Marcador de imagen de diapositiva 1"/>
+          <p:cNvSpPr>
+            <a:spLocks noGrp="1" noRot="1" noChangeAspect="1"/>
+          </p:cNvSpPr>
+          <p:nvPr>
+            <p:ph type="sldImg"/>
+          </p:nvPr>
+        </p:nvSpPr>
+        <p:spPr/>
+      </p:sp>
+      <p:sp>
+        <p:nvSpPr>
+          <p:cNvPr id="3" name="Marcador de notas 2"/>
+          <p:cNvSpPr>
+            <a:spLocks noGrp="1"/>
+          </p:cNvSpPr>
+          <p:nvPr>
+            <p:ph type="body" idx="1"/>
+          </p:nvPr>
+        </p:nvSpPr>
+        <p:spPr/>
+        <p:txBody>
+          <a:bodyPr/>
+          <a:lstStyle/>
+          <a:p>
+            <a:endParaRPr lang="es-CO"/>
+          </a:p>
+        </p:txBody>
+      </p:sp>
+      <p:sp>
+        <p:nvSpPr>
+          <p:cNvPr id="4" name="Marcador de número de diapositiva 3"/>
+          <p:cNvSpPr>
+            <a:spLocks noGrp="1"/>
+          </p:cNvSpPr>
+          <p:nvPr>
+            <p:ph type="sldNum" sz="quarter" idx="5"/>
+          </p:nvPr>
+        </p:nvSpPr>
+        <p:spPr/>
+        <p:txBody>
+          <a:bodyPr/>
+          <a:lstStyle/>
+          <a:p>
+            <a:fld id="{E745C70F-B179-4FD5-8C48-3F5C0CA2B965}" type="slidenum">
+              <a:rPr lang="es-CO" smtClean="0"/>
+              <a:t>6</a:t>
+            </a:fld>
+            <a:endParaRPr lang="es-CO"/>
+          </a:p>
+        </p:txBody>
+      </p:sp>
+    </p:spTree>
+    <p:extLst>
+      <p:ext uri="{BB962C8B-B14F-4D97-AF65-F5344CB8AC3E}">
+        <p14:creationId xmlns:p14="http://schemas.microsoft.com/office/powerpoint/2010/main" val="2343931025"/>
+      </p:ext>
+    </p:extLst>
+  </p:cSld>
+  <p:clrMapOvr>
+    <a:masterClrMapping/>
+  </p:clrMapOvr>
+</p:notes>
+</file>
+
+<file path=ppt/notesSlides/notesSlide2.xml><?xml version="1.0" encoding="utf-8"?>
+<p:notes xmlns:a="http://schemas.openxmlformats.org/drawingml/2006/main" xmlns:r="http://schemas.openxmlformats.org/officeDocument/2006/relationships" xmlns:p="http://schemas.openxmlformats.org/presentationml/2006/main">
+  <p:cSld>
+    <p:spTree>
+      <p:nvGrpSpPr>
+        <p:cNvPr id="1" name=""/>
+        <p:cNvGrpSpPr/>
+        <p:nvPr/>
+      </p:nvGrpSpPr>
+      <p:grpSpPr>
+        <a:xfrm>
+          <a:off x="0" y="0"/>
+          <a:ext cx="0" cy="0"/>
+          <a:chOff x="0" y="0"/>
+          <a:chExt cx="0" cy="0"/>
+        </a:xfrm>
+      </p:grpSpPr>
+      <p:sp>
+        <p:nvSpPr>
+          <p:cNvPr id="2" name="Marcador de imagen de diapositiva 1"/>
+          <p:cNvSpPr>
+            <a:spLocks noGrp="1" noRot="1" noChangeAspect="1"/>
+          </p:cNvSpPr>
+          <p:nvPr>
+            <p:ph type="sldImg"/>
+          </p:nvPr>
+        </p:nvSpPr>
+        <p:spPr/>
+      </p:sp>
+      <p:sp>
+        <p:nvSpPr>
+          <p:cNvPr id="3" name="Marcador de notas 2"/>
+          <p:cNvSpPr>
+            <a:spLocks noGrp="1"/>
+          </p:cNvSpPr>
+          <p:nvPr>
+            <p:ph type="body" idx="1"/>
+          </p:nvPr>
+        </p:nvSpPr>
+        <p:spPr/>
+        <p:txBody>
+          <a:bodyPr/>
+          <a:lstStyle/>
+          <a:p>
+            <a:endParaRPr lang="es-CO"/>
+          </a:p>
+        </p:txBody>
+      </p:sp>
+      <p:sp>
+        <p:nvSpPr>
+          <p:cNvPr id="4" name="Marcador de número de diapositiva 3"/>
+          <p:cNvSpPr>
+            <a:spLocks noGrp="1"/>
+          </p:cNvSpPr>
+          <p:nvPr>
+            <p:ph type="sldNum" sz="quarter" idx="5"/>
+          </p:nvPr>
+        </p:nvSpPr>
+        <p:spPr/>
+        <p:txBody>
+          <a:bodyPr/>
+          <a:lstStyle/>
+          <a:p>
+            <a:fld id="{E745C70F-B179-4FD5-8C48-3F5C0CA2B965}" type="slidenum">
+              <a:rPr lang="es-CO" smtClean="0"/>
+              <a:t>7</a:t>
+            </a:fld>
+            <a:endParaRPr lang="es-CO"/>
+          </a:p>
+        </p:txBody>
+      </p:sp>
+    </p:spTree>
+    <p:extLst>
+      <p:ext uri="{BB962C8B-B14F-4D97-AF65-F5344CB8AC3E}">
+        <p14:creationId xmlns:p14="http://schemas.microsoft.com/office/powerpoint/2010/main" val="1960273686"/>
+      </p:ext>
+    </p:extLst>
+  </p:cSld>
+  <p:clrMapOvr>
+    <a:masterClrMapping/>
+  </p:clrMapOvr>
+</p:notes>
+</file>
+
+<file path=ppt/notesSlides/notesSlide3.xml><?xml version="1.0" encoding="utf-8"?>
+<p:notes xmlns:a="http://schemas.openxmlformats.org/drawingml/2006/main" xmlns:r="http://schemas.openxmlformats.org/officeDocument/2006/relationships" xmlns:p="http://schemas.openxmlformats.org/presentationml/2006/main">
+  <p:cSld>
+    <p:spTree>
+      <p:nvGrpSpPr>
+        <p:cNvPr id="1" name=""/>
+        <p:cNvGrpSpPr/>
+        <p:nvPr/>
+      </p:nvGrpSpPr>
+      <p:grpSpPr>
+        <a:xfrm>
+          <a:off x="0" y="0"/>
+          <a:ext cx="0" cy="0"/>
+          <a:chOff x="0" y="0"/>
+          <a:chExt cx="0" cy="0"/>
+        </a:xfrm>
+      </p:grpSpPr>
+      <p:sp>
+        <p:nvSpPr>
+          <p:cNvPr id="2" name="Marcador de imagen de diapositiva 1"/>
+          <p:cNvSpPr>
+            <a:spLocks noGrp="1" noRot="1" noChangeAspect="1"/>
+          </p:cNvSpPr>
+          <p:nvPr>
+            <p:ph type="sldImg"/>
+          </p:nvPr>
+        </p:nvSpPr>
+        <p:spPr/>
+      </p:sp>
+      <p:sp>
+        <p:nvSpPr>
+          <p:cNvPr id="3" name="Marcador de notas 2"/>
+          <p:cNvSpPr>
+            <a:spLocks noGrp="1"/>
+          </p:cNvSpPr>
+          <p:nvPr>
+            <p:ph type="body" idx="1"/>
+          </p:nvPr>
+        </p:nvSpPr>
+        <p:spPr/>
+        <p:txBody>
+          <a:bodyPr/>
+          <a:lstStyle/>
+          <a:p>
+            <a:endParaRPr lang="es-CO"/>
+          </a:p>
+        </p:txBody>
+      </p:sp>
+      <p:sp>
+        <p:nvSpPr>
+          <p:cNvPr id="4" name="Marcador de número de diapositiva 3"/>
+          <p:cNvSpPr>
+            <a:spLocks noGrp="1"/>
+          </p:cNvSpPr>
+          <p:nvPr>
+            <p:ph type="sldNum" sz="quarter" idx="5"/>
+          </p:nvPr>
+        </p:nvSpPr>
+        <p:spPr/>
+        <p:txBody>
+          <a:bodyPr/>
+          <a:lstStyle/>
+          <a:p>
+            <a:fld id="{E745C70F-B179-4FD5-8C48-3F5C0CA2B965}" type="slidenum">
+              <a:rPr lang="es-CO" smtClean="0"/>
+              <a:t>8</a:t>
+            </a:fld>
+            <a:endParaRPr lang="es-CO"/>
+          </a:p>
+        </p:txBody>
+      </p:sp>
+    </p:spTree>
+    <p:extLst>
+      <p:ext uri="{BB962C8B-B14F-4D97-AF65-F5344CB8AC3E}">
+        <p14:creationId xmlns:p14="http://schemas.microsoft.com/office/powerpoint/2010/main" val="1916965640"/>
+      </p:ext>
+    </p:extLst>
+  </p:cSld>
+  <p:clrMapOvr>
+    <a:masterClrMapping/>
+  </p:clrMapOvr>
+</p:notes>
+</file>
+
+<file path=ppt/notesSlides/notesSlide4.xml><?xml version="1.0" encoding="utf-8"?>
+<p:notes xmlns:a="http://schemas.openxmlformats.org/drawingml/2006/main" xmlns:r="http://schemas.openxmlformats.org/officeDocument/2006/relationships" xmlns:p="http://schemas.openxmlformats.org/presentationml/2006/main">
+  <p:cSld>
+    <p:spTree>
+      <p:nvGrpSpPr>
+        <p:cNvPr id="1" name=""/>
+        <p:cNvGrpSpPr/>
+        <p:nvPr/>
+      </p:nvGrpSpPr>
+      <p:grpSpPr>
+        <a:xfrm>
+          <a:off x="0" y="0"/>
+          <a:ext cx="0" cy="0"/>
+          <a:chOff x="0" y="0"/>
+          <a:chExt cx="0" cy="0"/>
+        </a:xfrm>
+      </p:grpSpPr>
+      <p:sp>
+        <p:nvSpPr>
+          <p:cNvPr id="2" name="Marcador de imagen de diapositiva 1"/>
+          <p:cNvSpPr>
+            <a:spLocks noGrp="1" noRot="1" noChangeAspect="1"/>
+          </p:cNvSpPr>
+          <p:nvPr>
+            <p:ph type="sldImg"/>
+          </p:nvPr>
+        </p:nvSpPr>
+        <p:spPr/>
+      </p:sp>
+      <p:sp>
+        <p:nvSpPr>
+          <p:cNvPr id="3" name="Marcador de notas 2"/>
+          <p:cNvSpPr>
+            <a:spLocks noGrp="1"/>
+          </p:cNvSpPr>
+          <p:nvPr>
+            <p:ph type="body" idx="1"/>
+          </p:nvPr>
+        </p:nvSpPr>
+        <p:spPr/>
+        <p:txBody>
+          <a:bodyPr/>
+          <a:lstStyle/>
+          <a:p>
+            <a:endParaRPr lang="es-CO"/>
+          </a:p>
+        </p:txBody>
+      </p:sp>
+      <p:sp>
+        <p:nvSpPr>
+          <p:cNvPr id="4" name="Marcador de número de diapositiva 3"/>
+          <p:cNvSpPr>
+            <a:spLocks noGrp="1"/>
+          </p:cNvSpPr>
+          <p:nvPr>
+            <p:ph type="sldNum" sz="quarter" idx="5"/>
+          </p:nvPr>
+        </p:nvSpPr>
+        <p:spPr/>
+        <p:txBody>
+          <a:bodyPr/>
+          <a:lstStyle/>
+          <a:p>
+            <a:fld id="{E745C70F-B179-4FD5-8C48-3F5C0CA2B965}" type="slidenum">
+              <a:rPr lang="es-CO" smtClean="0"/>
+              <a:t>9</a:t>
+            </a:fld>
+            <a:endParaRPr lang="es-CO"/>
+          </a:p>
+        </p:txBody>
+      </p:sp>
+    </p:spTree>
+    <p:extLst>
+      <p:ext uri="{BB962C8B-B14F-4D97-AF65-F5344CB8AC3E}">
+        <p14:creationId xmlns:p14="http://schemas.microsoft.com/office/powerpoint/2010/main" val="2611257201"/>
+      </p:ext>
+    </p:extLst>
+  </p:cSld>
+  <p:clrMapOvr>
+    <a:masterClrMapping/>
+  </p:clrMapOvr>
+</p:notes>
 </file>
 
 <file path=ppt/slideLayouts/slideLayout1.xml><?xml version="1.0" encoding="utf-8"?>
@@ -3394,7 +4096,7 @@
           <a:lstStyle/>
           <a:p>
             <a:pPr algn="ctr"/>
-            <a:endParaRPr lang="es-CO" u="sng" dirty="0"/>
+            <a:endParaRPr lang="es-CO" u="sng"/>
           </a:p>
         </p:txBody>
       </p:sp>
@@ -3428,7 +4130,7 @@
           <a:p>
             <a:pPr algn="ctr"/>
             <a:r>
-              <a:rPr lang="es-CO" sz="2000" b="1" dirty="0">
+              <a:rPr lang="en-US" sz="2000" b="1">
                 <a:solidFill>
                   <a:schemeClr val="bg1"/>
                 </a:solidFill>
@@ -3436,13 +4138,13 @@
                 <a:ea typeface="Source Sans Pro" panose="020B0503030403020204" pitchFamily="34" charset="0"/>
                 <a:cs typeface="Arial" panose="020B0604020202020204" pitchFamily="34" charset="0"/>
               </a:rPr>
-              <a:t>Reunión 29 de Julio del 2024</a:t>
+              <a:t>Meeting July 29, 2024</a:t>
             </a:r>
           </a:p>
           <a:p>
             <a:pPr algn="ctr"/>
             <a:r>
-              <a:rPr lang="es-ES" sz="2000" dirty="0">
+              <a:rPr lang="en-US" sz="2000" b="1">
                 <a:solidFill>
                   <a:schemeClr val="bg1"/>
                 </a:solidFill>
@@ -3450,9 +4152,9 @@
                 <a:ea typeface="Source Sans Pro" panose="020B0503030403020204" pitchFamily="34" charset="0"/>
                 <a:cs typeface="Arial" panose="020B0604020202020204" pitchFamily="34" charset="0"/>
               </a:rPr>
-              <a:t>Modelación directa e inversa de propagación de ondas combinando enfoques clásicos y de aprendizaje automático</a:t>
-            </a:r>
-            <a:endParaRPr lang="es-CO" sz="2000" dirty="0">
+              <a:t>Forward and inverse modeling of wave propagation combining classical and machine learning approaches</a:t>
+            </a:r>
+            <a:endParaRPr lang="es-CO" sz="2000">
               <a:solidFill>
                 <a:schemeClr val="bg1"/>
               </a:solidFill>
@@ -3477,8 +4179,8 @@
         </p:nvSpPr>
         <p:spPr>
           <a:xfrm>
-            <a:off x="2290572" y="2949047"/>
-            <a:ext cx="7150608" cy="707886"/>
+            <a:off x="2002536" y="2949047"/>
+            <a:ext cx="7438644" cy="707886"/>
           </a:xfrm>
           <a:prstGeom prst="rect">
             <a:avLst/>
@@ -3493,7 +4195,7 @@
           <a:p>
             <a:pPr algn="ctr"/>
             <a:r>
-              <a:rPr lang="es-CO" sz="2000" b="1" dirty="0">
+              <a:rPr lang="es-CO" sz="2000" b="1">
                 <a:solidFill>
                   <a:schemeClr val="bg1"/>
                 </a:solidFill>
@@ -3501,10 +4203,10 @@
                 <a:ea typeface="Source Sans Pro" panose="020B0503030403020204" pitchFamily="34" charset="0"/>
                 <a:cs typeface="Arial" panose="020B0604020202020204" pitchFamily="34" charset="0"/>
               </a:rPr>
-              <a:t>Estudiante: </a:t>
-            </a:r>
-            <a:r>
-              <a:rPr lang="es-CO" sz="2000" dirty="0">
+              <a:t>Student: </a:t>
+            </a:r>
+            <a:r>
+              <a:rPr lang="es-CO" sz="2000">
                 <a:solidFill>
                   <a:schemeClr val="bg1"/>
                 </a:solidFill>
@@ -3518,7 +4220,7 @@
           <a:p>
             <a:pPr algn="ctr"/>
             <a:r>
-              <a:rPr lang="es-CO" sz="2000" b="1" dirty="0">
+              <a:rPr lang="es-CO" sz="2000" b="1">
                 <a:solidFill>
                   <a:schemeClr val="bg1"/>
                 </a:solidFill>
@@ -3526,10 +4228,10 @@
                 <a:ea typeface="Source Sans Pro" panose="020B0503030403020204" pitchFamily="34" charset="0"/>
                 <a:cs typeface="Arial" panose="020B0604020202020204" pitchFamily="34" charset="0"/>
               </a:rPr>
-              <a:t>Asesores: </a:t>
-            </a:r>
-            <a:r>
-              <a:rPr lang="es-CO" sz="2000" dirty="0">
+              <a:t>Advisors: </a:t>
+            </a:r>
+            <a:r>
+              <a:rPr lang="es-CO" sz="2000">
                 <a:solidFill>
                   <a:schemeClr val="bg1"/>
                 </a:solidFill>
@@ -3537,7 +4239,7 @@
                 <a:ea typeface="Source Sans Pro" panose="020B0503030403020204" pitchFamily="34" charset="0"/>
                 <a:cs typeface="Arial" panose="020B0604020202020204" pitchFamily="34" charset="0"/>
               </a:rPr>
-              <a:t>Prof. Nicolas Guarín Zapata y Silvana Montoya </a:t>
+              <a:t>Nicolas Guarín Zapata and Silvana Montoya</a:t>
             </a:r>
           </a:p>
         </p:txBody>
@@ -3556,7 +4258,7 @@
         </p:nvSpPr>
         <p:spPr>
           <a:xfrm>
-            <a:off x="2290572" y="4903523"/>
+            <a:off x="2520696" y="5281434"/>
             <a:ext cx="7150608" cy="707886"/>
           </a:xfrm>
           <a:prstGeom prst="rect">
@@ -3572,7 +4274,21 @@
           <a:p>
             <a:pPr algn="ctr"/>
             <a:r>
-              <a:rPr lang="es-CO" sz="2000" dirty="0">
+              <a:rPr lang="es-CO" sz="2000">
+                <a:solidFill>
+                  <a:schemeClr val="bg1"/>
+                </a:solidFill>
+                <a:latin typeface="Arial" panose="020B0604020202020204" pitchFamily="34" charset="0"/>
+                <a:ea typeface="Source Sans Pro" panose="020B0503030403020204" pitchFamily="34" charset="0"/>
+                <a:cs typeface="Arial" panose="020B0604020202020204" pitchFamily="34" charset="0"/>
+              </a:rPr>
+              <a:t>Applied Mechanics research group</a:t>
+            </a:r>
+          </a:p>
+          <a:p>
+            <a:pPr algn="ctr"/>
+            <a:r>
+              <a:rPr lang="es-CO" sz="2000">
                 <a:solidFill>
                   <a:schemeClr val="bg1"/>
                 </a:solidFill>
@@ -3583,10 +4299,206 @@
               <a:t>Universidad EAFIT</a:t>
             </a:r>
           </a:p>
+        </p:txBody>
+      </p:sp>
+      <p:pic>
+        <p:nvPicPr>
+          <p:cNvPr id="9" name="Gráfico 8">
+            <a:extLst>
+              <a:ext uri="{FF2B5EF4-FFF2-40B4-BE49-F238E27FC236}">
+                <a16:creationId xmlns:a16="http://schemas.microsoft.com/office/drawing/2014/main" id="{AB36FE26-64C6-3E86-480D-E7256AA3282C}"/>
+              </a:ext>
+            </a:extLst>
+          </p:cNvPr>
+          <p:cNvPicPr>
+            <a:picLocks noChangeAspect="1"/>
+          </p:cNvPicPr>
+          <p:nvPr/>
+        </p:nvPicPr>
+        <p:blipFill>
+          <a:blip r:embed="rId2">
+            <a:extLst>
+              <a:ext uri="{96DAC541-7B7A-43D3-8B79-37D633B846F1}">
+                <asvg:svgBlip xmlns:asvg="http://schemas.microsoft.com/office/drawing/2016/SVG/main" r:embed="rId3"/>
+              </a:ext>
+            </a:extLst>
+          </a:blip>
+          <a:stretch>
+            <a:fillRect/>
+          </a:stretch>
+        </p:blipFill>
+        <p:spPr>
+          <a:xfrm>
+            <a:off x="10375201" y="5971603"/>
+            <a:ext cx="1609725" cy="657225"/>
+          </a:xfrm>
+          <a:prstGeom prst="rect">
+            <a:avLst/>
+          </a:prstGeom>
+        </p:spPr>
+      </p:pic>
+      <p:pic>
+        <p:nvPicPr>
+          <p:cNvPr id="1026" name="Picture 2" descr="@AppliedMechanics-EAFIT">
+            <a:extLst>
+              <a:ext uri="{FF2B5EF4-FFF2-40B4-BE49-F238E27FC236}">
+                <a16:creationId xmlns:a16="http://schemas.microsoft.com/office/drawing/2014/main" id="{4FC60080-2A06-7895-D1C8-629794774466}"/>
+              </a:ext>
+            </a:extLst>
+          </p:cNvPr>
+          <p:cNvPicPr>
+            <a:picLocks noChangeAspect="1" noChangeArrowheads="1"/>
+          </p:cNvPicPr>
+          <p:nvPr/>
+        </p:nvPicPr>
+        <p:blipFill>
+          <a:blip r:embed="rId4">
+            <a:extLst>
+              <a:ext uri="{28A0092B-C50C-407E-A947-70E740481C1C}">
+                <a14:useLocalDpi xmlns:a14="http://schemas.microsoft.com/office/drawing/2010/main" val="0"/>
+              </a:ext>
+            </a:extLst>
+          </a:blip>
+          <a:srcRect/>
+          <a:stretch>
+            <a:fillRect/>
+          </a:stretch>
+        </p:blipFill>
+        <p:spPr bwMode="auto">
+          <a:xfrm>
+            <a:off x="207074" y="4812751"/>
+            <a:ext cx="1905000" cy="1905000"/>
+          </a:xfrm>
+          <a:prstGeom prst="rect">
+            <a:avLst/>
+          </a:prstGeom>
+          <a:noFill/>
+          <a:extLst>
+            <a:ext uri="{909E8E84-426E-40DD-AFC4-6F175D3DCCD1}">
+              <a14:hiddenFill xmlns:a14="http://schemas.microsoft.com/office/drawing/2010/main">
+                <a:solidFill>
+                  <a:srgbClr val="FFFFFF"/>
+                </a:solidFill>
+              </a14:hiddenFill>
+            </a:ext>
+          </a:extLst>
+        </p:spPr>
+      </p:pic>
+    </p:spTree>
+    <p:extLst>
+      <p:ext uri="{BB962C8B-B14F-4D97-AF65-F5344CB8AC3E}">
+        <p14:creationId xmlns:p14="http://schemas.microsoft.com/office/powerpoint/2010/main" val="2198032440"/>
+      </p:ext>
+    </p:extLst>
+  </p:cSld>
+  <p:clrMapOvr>
+    <a:masterClrMapping/>
+  </p:clrMapOvr>
+</p:sld>
+</file>
+
+<file path=ppt/slides/slide10.xml><?xml version="1.0" encoding="utf-8"?>
+<p:sld xmlns:a="http://schemas.openxmlformats.org/drawingml/2006/main" xmlns:r="http://schemas.openxmlformats.org/officeDocument/2006/relationships" xmlns:p="http://schemas.openxmlformats.org/presentationml/2006/main">
+  <p:cSld>
+    <p:spTree>
+      <p:nvGrpSpPr>
+        <p:cNvPr id="1" name=""/>
+        <p:cNvGrpSpPr/>
+        <p:nvPr/>
+      </p:nvGrpSpPr>
+      <p:grpSpPr>
+        <a:xfrm>
+          <a:off x="0" y="0"/>
+          <a:ext cx="0" cy="0"/>
+          <a:chOff x="0" y="0"/>
+          <a:chExt cx="0" cy="0"/>
+        </a:xfrm>
+      </p:grpSpPr>
+      <p:sp>
+        <p:nvSpPr>
+          <p:cNvPr id="2" name="Rectángulo 1">
+            <a:extLst>
+              <a:ext uri="{FF2B5EF4-FFF2-40B4-BE49-F238E27FC236}">
+                <a16:creationId xmlns:a16="http://schemas.microsoft.com/office/drawing/2014/main" id="{33B43DF0-55BF-79E0-2273-FD3CA4767423}"/>
+              </a:ext>
+            </a:extLst>
+          </p:cNvPr>
+          <p:cNvSpPr/>
+          <p:nvPr/>
+        </p:nvSpPr>
+        <p:spPr>
+          <a:xfrm>
+            <a:off x="0" y="0"/>
+            <a:ext cx="12192000" cy="6858000"/>
+          </a:xfrm>
+          <a:prstGeom prst="rect">
+            <a:avLst/>
+          </a:prstGeom>
+          <a:solidFill>
+            <a:schemeClr val="accent1">
+              <a:lumMod val="75000"/>
+            </a:schemeClr>
+          </a:solidFill>
+          <a:ln>
+            <a:noFill/>
+          </a:ln>
+        </p:spPr>
+        <p:style>
+          <a:lnRef idx="2">
+            <a:schemeClr val="accent1">
+              <a:shade val="15000"/>
+            </a:schemeClr>
+          </a:lnRef>
+          <a:fillRef idx="1">
+            <a:schemeClr val="accent1"/>
+          </a:fillRef>
+          <a:effectRef idx="0">
+            <a:schemeClr val="accent1"/>
+          </a:effectRef>
+          <a:fontRef idx="minor">
+            <a:schemeClr val="lt1"/>
+          </a:fontRef>
+        </p:style>
+        <p:txBody>
+          <a:bodyPr rtlCol="0" anchor="ctr"/>
+          <a:lstStyle/>
           <a:p>
             <a:pPr algn="ctr"/>
-            <a:r>
-              <a:rPr lang="es-CO" sz="2000" dirty="0">
+            <a:endParaRPr lang="es-CO"/>
+          </a:p>
+        </p:txBody>
+      </p:sp>
+      <p:sp>
+        <p:nvSpPr>
+          <p:cNvPr id="3" name="CuadroTexto 2">
+            <a:extLst>
+              <a:ext uri="{FF2B5EF4-FFF2-40B4-BE49-F238E27FC236}">
+                <a16:creationId xmlns:a16="http://schemas.microsoft.com/office/drawing/2014/main" id="{254F0281-F108-BD43-3A10-671B6D0CB599}"/>
+              </a:ext>
+            </a:extLst>
+          </p:cNvPr>
+          <p:cNvSpPr txBox="1"/>
+          <p:nvPr/>
+        </p:nvSpPr>
+        <p:spPr>
+          <a:xfrm>
+            <a:off x="2520696" y="457200"/>
+            <a:ext cx="7150608" cy="461665"/>
+          </a:xfrm>
+          <a:prstGeom prst="rect">
+            <a:avLst/>
+          </a:prstGeom>
+          <a:noFill/>
+        </p:spPr>
+        <p:txBody>
+          <a:bodyPr wrap="square" rtlCol="0">
+            <a:spAutoFit/>
+          </a:bodyPr>
+          <a:lstStyle/>
+          <a:p>
+            <a:pPr algn="ctr"/>
+            <a:r>
+              <a:rPr lang="es-CO" sz="2400" b="1">
                 <a:solidFill>
                   <a:schemeClr val="bg1"/>
                 </a:solidFill>
@@ -3594,15 +4506,178 @@
                 <a:ea typeface="Source Sans Pro" panose="020B0503030403020204" pitchFamily="34" charset="0"/>
                 <a:cs typeface="Arial" panose="020B0604020202020204" pitchFamily="34" charset="0"/>
               </a:rPr>
-              <a:t>29 de Julio del 2024</a:t>
-            </a:r>
-          </a:p>
-        </p:txBody>
-      </p:sp>
+              <a:t>Revisión Sistemática de aplicaciones</a:t>
+            </a:r>
+          </a:p>
+        </p:txBody>
+      </p:sp>
+      <p:pic>
+        <p:nvPicPr>
+          <p:cNvPr id="5" name="Gráfico 4">
+            <a:extLst>
+              <a:ext uri="{FF2B5EF4-FFF2-40B4-BE49-F238E27FC236}">
+                <a16:creationId xmlns:a16="http://schemas.microsoft.com/office/drawing/2014/main" id="{E9F2DDC7-9B0E-704A-F987-24E70FE1A9A7}"/>
+              </a:ext>
+            </a:extLst>
+          </p:cNvPr>
+          <p:cNvPicPr>
+            <a:picLocks noChangeAspect="1"/>
+          </p:cNvPicPr>
+          <p:nvPr/>
+        </p:nvPicPr>
+        <p:blipFill>
+          <a:blip r:embed="rId2">
+            <a:extLst>
+              <a:ext uri="{96DAC541-7B7A-43D3-8B79-37D633B846F1}">
+                <asvg:svgBlip xmlns:asvg="http://schemas.microsoft.com/office/drawing/2016/SVG/main" r:embed="rId3"/>
+              </a:ext>
+            </a:extLst>
+          </a:blip>
+          <a:stretch>
+            <a:fillRect/>
+          </a:stretch>
+        </p:blipFill>
+        <p:spPr>
+          <a:xfrm>
+            <a:off x="647700" y="2045345"/>
+            <a:ext cx="10892453" cy="2860030"/>
+          </a:xfrm>
+          <a:prstGeom prst="rect">
+            <a:avLst/>
+          </a:prstGeom>
+        </p:spPr>
+      </p:pic>
     </p:spTree>
     <p:extLst>
       <p:ext uri="{BB962C8B-B14F-4D97-AF65-F5344CB8AC3E}">
-        <p14:creationId xmlns:p14="http://schemas.microsoft.com/office/powerpoint/2010/main" val="2198032440"/>
+        <p14:creationId xmlns:p14="http://schemas.microsoft.com/office/powerpoint/2010/main" val="1470438773"/>
+      </p:ext>
+    </p:extLst>
+  </p:cSld>
+  <p:clrMapOvr>
+    <a:masterClrMapping/>
+  </p:clrMapOvr>
+</p:sld>
+</file>
+
+<file path=ppt/slides/slide11.xml><?xml version="1.0" encoding="utf-8"?>
+<p:sld xmlns:a="http://schemas.openxmlformats.org/drawingml/2006/main" xmlns:r="http://schemas.openxmlformats.org/officeDocument/2006/relationships" xmlns:p="http://schemas.openxmlformats.org/presentationml/2006/main">
+  <p:cSld>
+    <p:spTree>
+      <p:nvGrpSpPr>
+        <p:cNvPr id="1" name=""/>
+        <p:cNvGrpSpPr/>
+        <p:nvPr/>
+      </p:nvGrpSpPr>
+      <p:grpSpPr>
+        <a:xfrm>
+          <a:off x="0" y="0"/>
+          <a:ext cx="0" cy="0"/>
+          <a:chOff x="0" y="0"/>
+          <a:chExt cx="0" cy="0"/>
+        </a:xfrm>
+      </p:grpSpPr>
+      <p:sp>
+        <p:nvSpPr>
+          <p:cNvPr id="2" name="Rectángulo 1">
+            <a:extLst>
+              <a:ext uri="{FF2B5EF4-FFF2-40B4-BE49-F238E27FC236}">
+                <a16:creationId xmlns:a16="http://schemas.microsoft.com/office/drawing/2014/main" id="{33B43DF0-55BF-79E0-2273-FD3CA4767423}"/>
+              </a:ext>
+            </a:extLst>
+          </p:cNvPr>
+          <p:cNvSpPr/>
+          <p:nvPr/>
+        </p:nvSpPr>
+        <p:spPr>
+          <a:xfrm>
+            <a:off x="0" y="0"/>
+            <a:ext cx="12192000" cy="6858000"/>
+          </a:xfrm>
+          <a:prstGeom prst="rect">
+            <a:avLst/>
+          </a:prstGeom>
+          <a:solidFill>
+            <a:schemeClr val="accent1">
+              <a:lumMod val="75000"/>
+            </a:schemeClr>
+          </a:solidFill>
+          <a:ln>
+            <a:noFill/>
+          </a:ln>
+        </p:spPr>
+        <p:style>
+          <a:lnRef idx="2">
+            <a:schemeClr val="accent1">
+              <a:shade val="15000"/>
+            </a:schemeClr>
+          </a:lnRef>
+          <a:fillRef idx="1">
+            <a:schemeClr val="accent1"/>
+          </a:fillRef>
+          <a:effectRef idx="0">
+            <a:schemeClr val="accent1"/>
+          </a:effectRef>
+          <a:fontRef idx="minor">
+            <a:schemeClr val="lt1"/>
+          </a:fontRef>
+        </p:style>
+        <p:txBody>
+          <a:bodyPr rtlCol="0" anchor="ctr"/>
+          <a:lstStyle/>
+          <a:p>
+            <a:pPr algn="ctr"/>
+            <a:endParaRPr lang="es-CO"/>
+          </a:p>
+        </p:txBody>
+      </p:sp>
+      <p:sp>
+        <p:nvSpPr>
+          <p:cNvPr id="3" name="CuadroTexto 2">
+            <a:extLst>
+              <a:ext uri="{FF2B5EF4-FFF2-40B4-BE49-F238E27FC236}">
+                <a16:creationId xmlns:a16="http://schemas.microsoft.com/office/drawing/2014/main" id="{254F0281-F108-BD43-3A10-671B6D0CB599}"/>
+              </a:ext>
+            </a:extLst>
+          </p:cNvPr>
+          <p:cNvSpPr txBox="1"/>
+          <p:nvPr/>
+        </p:nvSpPr>
+        <p:spPr>
+          <a:xfrm>
+            <a:off x="2520696" y="457200"/>
+            <a:ext cx="7150608" cy="461665"/>
+          </a:xfrm>
+          <a:prstGeom prst="rect">
+            <a:avLst/>
+          </a:prstGeom>
+          <a:noFill/>
+        </p:spPr>
+        <p:txBody>
+          <a:bodyPr wrap="square" rtlCol="0">
+            <a:spAutoFit/>
+          </a:bodyPr>
+          <a:lstStyle/>
+          <a:p>
+            <a:pPr algn="ctr"/>
+            <a:r>
+              <a:rPr lang="es-CO" sz="2400" b="1">
+                <a:solidFill>
+                  <a:schemeClr val="bg1"/>
+                </a:solidFill>
+                <a:latin typeface="Arial" panose="020B0604020202020204" pitchFamily="34" charset="0"/>
+                <a:ea typeface="Source Sans Pro" panose="020B0503030403020204" pitchFamily="34" charset="0"/>
+                <a:cs typeface="Arial" panose="020B0604020202020204" pitchFamily="34" charset="0"/>
+              </a:rPr>
+              <a:t>Ventajas / Desvantajas </a:t>
+            </a:r>
+          </a:p>
+        </p:txBody>
+      </p:sp>
+    </p:spTree>
+    <p:extLst>
+      <p:ext uri="{BB962C8B-B14F-4D97-AF65-F5344CB8AC3E}">
+        <p14:creationId xmlns:p14="http://schemas.microsoft.com/office/powerpoint/2010/main" val="2764051299"/>
       </p:ext>
     </p:extLst>
   </p:cSld>
@@ -3679,7 +4754,7 @@
           <a:lstStyle/>
           <a:p>
             <a:pPr algn="ctr"/>
-            <a:endParaRPr lang="es-CO" dirty="0"/>
+            <a:endParaRPr lang="es-CO"/>
           </a:p>
         </p:txBody>
       </p:sp>
@@ -3698,7 +4773,7 @@
         <p:spPr>
           <a:xfrm>
             <a:off x="2520696" y="457200"/>
-            <a:ext cx="7150608" cy="400110"/>
+            <a:ext cx="7150608" cy="461665"/>
           </a:xfrm>
           <a:prstGeom prst="rect">
             <a:avLst/>
@@ -3713,7 +4788,7 @@
           <a:p>
             <a:pPr algn="ctr"/>
             <a:r>
-              <a:rPr lang="es-CO" sz="2000" b="1" dirty="0">
+              <a:rPr lang="es-CO" sz="2400" b="1">
                 <a:solidFill>
                   <a:schemeClr val="bg1"/>
                 </a:solidFill>
@@ -3721,17 +4796,53 @@
                 <a:ea typeface="Source Sans Pro" panose="020B0503030403020204" pitchFamily="34" charset="0"/>
                 <a:cs typeface="Arial" panose="020B0604020202020204" pitchFamily="34" charset="0"/>
               </a:rPr>
-              <a:t>Contenido</a:t>
-            </a:r>
-          </a:p>
-        </p:txBody>
-      </p:sp>
-      <p:sp>
-        <p:nvSpPr>
-          <p:cNvPr id="8" name="CuadroTexto 7">
-            <a:extLst>
-              <a:ext uri="{FF2B5EF4-FFF2-40B4-BE49-F238E27FC236}">
-                <a16:creationId xmlns:a16="http://schemas.microsoft.com/office/drawing/2014/main" id="{AB805A34-242C-3C12-31BC-70CADF1AAA01}"/>
+              <a:t>Introduction</a:t>
+            </a:r>
+          </a:p>
+        </p:txBody>
+      </p:sp>
+      <p:pic>
+        <p:nvPicPr>
+          <p:cNvPr id="10" name="Gráfico 9">
+            <a:extLst>
+              <a:ext uri="{FF2B5EF4-FFF2-40B4-BE49-F238E27FC236}">
+                <a16:creationId xmlns:a16="http://schemas.microsoft.com/office/drawing/2014/main" id="{E2566563-CEC1-1550-121C-345DC36DCDF5}"/>
+              </a:ext>
+            </a:extLst>
+          </p:cNvPr>
+          <p:cNvPicPr>
+            <a:picLocks noChangeAspect="1"/>
+          </p:cNvPicPr>
+          <p:nvPr/>
+        </p:nvPicPr>
+        <p:blipFill>
+          <a:blip r:embed="rId2">
+            <a:extLst>
+              <a:ext uri="{96DAC541-7B7A-43D3-8B79-37D633B846F1}">
+                <asvg:svgBlip xmlns:asvg="http://schemas.microsoft.com/office/drawing/2016/SVG/main" r:embed="rId3"/>
+              </a:ext>
+            </a:extLst>
+          </a:blip>
+          <a:stretch>
+            <a:fillRect/>
+          </a:stretch>
+        </p:blipFill>
+        <p:spPr>
+          <a:xfrm>
+            <a:off x="3350999" y="2222756"/>
+            <a:ext cx="5269126" cy="3518957"/>
+          </a:xfrm>
+          <a:prstGeom prst="rect">
+            <a:avLst/>
+          </a:prstGeom>
+        </p:spPr>
+      </p:pic>
+      <p:sp>
+        <p:nvSpPr>
+          <p:cNvPr id="142" name="CuadroTexto 141">
+            <a:extLst>
+              <a:ext uri="{FF2B5EF4-FFF2-40B4-BE49-F238E27FC236}">
+                <a16:creationId xmlns:a16="http://schemas.microsoft.com/office/drawing/2014/main" id="{05A1B72F-A3E0-D3C6-90D0-707E4D805AE0}"/>
               </a:ext>
             </a:extLst>
           </p:cNvPr>
@@ -3740,8 +4851,8 @@
         </p:nvSpPr>
         <p:spPr>
           <a:xfrm>
-            <a:off x="1757934" y="1739360"/>
-            <a:ext cx="6094476" cy="1477328"/>
+            <a:off x="1000125" y="1116287"/>
+            <a:ext cx="10020299" cy="646331"/>
           </a:xfrm>
           <a:prstGeom prst="rect">
             <a:avLst/>
@@ -3754,74 +4865,173 @@
           </a:bodyPr>
           <a:lstStyle/>
           <a:p>
-            <a:pPr marL="342900" indent="-342900">
-              <a:buFontTx/>
-              <a:buChar char="-"/>
-            </a:pPr>
-            <a:r>
-              <a:rPr lang="es-CO" sz="1800" dirty="0">
+            <a:r>
+              <a:rPr lang="es-CO">
                 <a:solidFill>
                   <a:schemeClr val="bg1"/>
                 </a:solidFill>
-                <a:latin typeface="Arial" panose="020B0604020202020204" pitchFamily="34" charset="0"/>
-                <a:ea typeface="Source Sans Pro" panose="020B0503030403020204" pitchFamily="34" charset="0"/>
-                <a:cs typeface="Arial" panose="020B0604020202020204" pitchFamily="34" charset="0"/>
               </a:rPr>
-              <a:t>Revisión de literatura</a:t>
-            </a:r>
-          </a:p>
-          <a:p>
-            <a:endParaRPr lang="es-CO" sz="1800" dirty="0">
-              <a:solidFill>
-                <a:schemeClr val="bg1"/>
-              </a:solidFill>
-              <a:latin typeface="Arial" panose="020B0604020202020204" pitchFamily="34" charset="0"/>
-              <a:ea typeface="Source Sans Pro" panose="020B0503030403020204" pitchFamily="34" charset="0"/>
-              <a:cs typeface="Arial" panose="020B0604020202020204" pitchFamily="34" charset="0"/>
-            </a:endParaRPr>
-          </a:p>
-          <a:p>
-            <a:pPr marL="342900" indent="-342900">
-              <a:buFontTx/>
-              <a:buChar char="-"/>
-            </a:pPr>
-            <a:r>
-              <a:rPr lang="es-CO" sz="1800" dirty="0">
+              <a:t>"machine </a:t>
+            </a:r>
+            <a:r>
+              <a:rPr lang="es-CO" err="1">
                 <a:solidFill>
                   <a:schemeClr val="bg1"/>
                 </a:solidFill>
-                <a:latin typeface="Arial" panose="020B0604020202020204" pitchFamily="34" charset="0"/>
-                <a:ea typeface="Source Sans Pro" panose="020B0503030403020204" pitchFamily="34" charset="0"/>
-                <a:cs typeface="Arial" panose="020B0604020202020204" pitchFamily="34" charset="0"/>
               </a:rPr>
-              <a:t>Reproducción de Raissi et al. (2019)</a:t>
-            </a:r>
-          </a:p>
-          <a:p>
-            <a:endParaRPr lang="es-CO" sz="1800" dirty="0">
-              <a:solidFill>
-                <a:schemeClr val="bg1"/>
-              </a:solidFill>
-              <a:latin typeface="Arial" panose="020B0604020202020204" pitchFamily="34" charset="0"/>
-              <a:ea typeface="Source Sans Pro" panose="020B0503030403020204" pitchFamily="34" charset="0"/>
-              <a:cs typeface="Arial" panose="020B0604020202020204" pitchFamily="34" charset="0"/>
-            </a:endParaRPr>
-          </a:p>
-          <a:p>
-            <a:pPr marL="342900" indent="-342900">
-              <a:buFontTx/>
-              <a:buChar char="-"/>
-            </a:pPr>
-            <a:r>
-              <a:rPr lang="es-CO" sz="1800" dirty="0">
+              <a:t>learning</a:t>
+            </a:r>
+            <a:r>
+              <a:rPr lang="es-CO">
                 <a:solidFill>
                   <a:schemeClr val="bg1"/>
                 </a:solidFill>
-                <a:latin typeface="Arial" panose="020B0604020202020204" pitchFamily="34" charset="0"/>
-                <a:ea typeface="Source Sans Pro" panose="020B0503030403020204" pitchFamily="34" charset="0"/>
-                <a:cs typeface="Arial" panose="020B0604020202020204" pitchFamily="34" charset="0"/>
               </a:rPr>
-              <a:t>Planteamiento del problema</a:t>
+              <a:t>" OR "</a:t>
+            </a:r>
+            <a:r>
+              <a:rPr lang="es-CO" err="1">
+                <a:solidFill>
+                  <a:schemeClr val="bg1"/>
+                </a:solidFill>
+              </a:rPr>
+              <a:t>deep</a:t>
+            </a:r>
+            <a:r>
+              <a:rPr lang="es-CO">
+                <a:solidFill>
+                  <a:schemeClr val="bg1"/>
+                </a:solidFill>
+              </a:rPr>
+              <a:t> </a:t>
+            </a:r>
+            <a:r>
+              <a:rPr lang="es-CO" err="1">
+                <a:solidFill>
+                  <a:schemeClr val="bg1"/>
+                </a:solidFill>
+              </a:rPr>
+              <a:t>learning</a:t>
+            </a:r>
+            <a:r>
+              <a:rPr lang="es-CO">
+                <a:solidFill>
+                  <a:schemeClr val="bg1"/>
+                </a:solidFill>
+              </a:rPr>
+              <a:t>" OR "neural </a:t>
+            </a:r>
+            <a:r>
+              <a:rPr lang="es-CO" err="1">
+                <a:solidFill>
+                  <a:schemeClr val="bg1"/>
+                </a:solidFill>
+              </a:rPr>
+              <a:t>networks</a:t>
+            </a:r>
+            <a:r>
+              <a:rPr lang="es-CO">
+                <a:solidFill>
+                  <a:schemeClr val="bg1"/>
+                </a:solidFill>
+              </a:rPr>
+              <a:t>" AND "wave </a:t>
+            </a:r>
+            <a:r>
+              <a:rPr lang="es-CO" err="1">
+                <a:solidFill>
+                  <a:schemeClr val="bg1"/>
+                </a:solidFill>
+              </a:rPr>
+              <a:t>propagation</a:t>
+            </a:r>
+            <a:r>
+              <a:rPr lang="es-CO">
+                <a:solidFill>
+                  <a:schemeClr val="bg1"/>
+                </a:solidFill>
+              </a:rPr>
+              <a:t>" OR "wave </a:t>
+            </a:r>
+            <a:r>
+              <a:rPr lang="es-CO" err="1">
+                <a:solidFill>
+                  <a:schemeClr val="bg1"/>
+                </a:solidFill>
+              </a:rPr>
+              <a:t>equation</a:t>
+            </a:r>
+            <a:r>
+              <a:rPr lang="es-CO">
+                <a:solidFill>
+                  <a:schemeClr val="bg1"/>
+                </a:solidFill>
+              </a:rPr>
+              <a:t>" AND (</a:t>
+            </a:r>
+            <a:r>
+              <a:rPr lang="es-CO" err="1">
+                <a:solidFill>
+                  <a:schemeClr val="bg1"/>
+                </a:solidFill>
+              </a:rPr>
+              <a:t>modeling</a:t>
+            </a:r>
+            <a:r>
+              <a:rPr lang="es-CO">
+                <a:solidFill>
+                  <a:schemeClr val="bg1"/>
+                </a:solidFill>
+              </a:rPr>
+              <a:t> OR </a:t>
+            </a:r>
+            <a:r>
+              <a:rPr lang="es-CO" err="1">
+                <a:solidFill>
+                  <a:schemeClr val="bg1"/>
+                </a:solidFill>
+              </a:rPr>
+              <a:t>modelling</a:t>
+            </a:r>
+            <a:r>
+              <a:rPr lang="es-CO">
+                <a:solidFill>
+                  <a:schemeClr val="bg1"/>
+                </a:solidFill>
+              </a:rPr>
+              <a:t> OR </a:t>
+            </a:r>
+            <a:r>
+              <a:rPr lang="es-CO" err="1">
+                <a:solidFill>
+                  <a:schemeClr val="bg1"/>
+                </a:solidFill>
+              </a:rPr>
+              <a:t>model</a:t>
+            </a:r>
+            <a:r>
+              <a:rPr lang="es-CO">
+                <a:solidFill>
+                  <a:schemeClr val="bg1"/>
+                </a:solidFill>
+              </a:rPr>
+              <a:t> OR </a:t>
+            </a:r>
+            <a:r>
+              <a:rPr lang="es-CO" err="1">
+                <a:solidFill>
+                  <a:schemeClr val="bg1"/>
+                </a:solidFill>
+              </a:rPr>
+              <a:t>simulation</a:t>
+            </a:r>
+            <a:r>
+              <a:rPr lang="es-CO">
+                <a:solidFill>
+                  <a:schemeClr val="bg1"/>
+                </a:solidFill>
+              </a:rPr>
+              <a:t>)</a:t>
             </a:r>
           </a:p>
         </p:txBody>
@@ -3829,7 +5039,7 @@
     </p:spTree>
     <p:extLst>
       <p:ext uri="{BB962C8B-B14F-4D97-AF65-F5344CB8AC3E}">
-        <p14:creationId xmlns:p14="http://schemas.microsoft.com/office/powerpoint/2010/main" val="3177409519"/>
+        <p14:creationId xmlns:p14="http://schemas.microsoft.com/office/powerpoint/2010/main" val="1476158871"/>
       </p:ext>
     </p:extLst>
   </p:cSld>
@@ -3906,7 +5116,7 @@
           <a:lstStyle/>
           <a:p>
             <a:pPr algn="ctr"/>
-            <a:endParaRPr lang="es-CO" dirty="0"/>
+            <a:endParaRPr lang="es-CO"/>
           </a:p>
         </p:txBody>
       </p:sp>
@@ -3925,7 +5135,7 @@
         <p:spPr>
           <a:xfrm>
             <a:off x="2520696" y="457200"/>
-            <a:ext cx="7150608" cy="400110"/>
+            <a:ext cx="7150608" cy="461665"/>
           </a:xfrm>
           <a:prstGeom prst="rect">
             <a:avLst/>
@@ -3940,7 +5150,7 @@
           <a:p>
             <a:pPr algn="ctr"/>
             <a:r>
-              <a:rPr lang="es-CO" sz="2000" b="1" dirty="0">
+              <a:rPr lang="en-US" sz="2400" b="1">
                 <a:solidFill>
                   <a:schemeClr val="bg1"/>
                 </a:solidFill>
@@ -3948,17 +5158,25 @@
                 <a:ea typeface="Source Sans Pro" panose="020B0503030403020204" pitchFamily="34" charset="0"/>
                 <a:cs typeface="Arial" panose="020B0604020202020204" pitchFamily="34" charset="0"/>
               </a:rPr>
-              <a:t>Estructura de artículo de revisión</a:t>
-            </a:r>
-          </a:p>
-        </p:txBody>
-      </p:sp>
-      <p:sp>
-        <p:nvSpPr>
-          <p:cNvPr id="8" name="CuadroTexto 7">
-            <a:extLst>
-              <a:ext uri="{FF2B5EF4-FFF2-40B4-BE49-F238E27FC236}">
-                <a16:creationId xmlns:a16="http://schemas.microsoft.com/office/drawing/2014/main" id="{AB805A34-242C-3C12-31BC-70CADF1AAA01}"/>
+              <a:t>Modeling of Mechanical Wave Propagation</a:t>
+            </a:r>
+            <a:endParaRPr lang="es-CO" sz="2400" b="1">
+              <a:solidFill>
+                <a:schemeClr val="bg1"/>
+              </a:solidFill>
+              <a:latin typeface="Arial" panose="020B0604020202020204" pitchFamily="34" charset="0"/>
+              <a:ea typeface="Source Sans Pro" panose="020B0503030403020204" pitchFamily="34" charset="0"/>
+              <a:cs typeface="Arial" panose="020B0604020202020204" pitchFamily="34" charset="0"/>
+            </a:endParaRPr>
+          </a:p>
+        </p:txBody>
+      </p:sp>
+      <p:sp>
+        <p:nvSpPr>
+          <p:cNvPr id="142" name="CuadroTexto 141">
+            <a:extLst>
+              <a:ext uri="{FF2B5EF4-FFF2-40B4-BE49-F238E27FC236}">
+                <a16:creationId xmlns:a16="http://schemas.microsoft.com/office/drawing/2014/main" id="{05A1B72F-A3E0-D3C6-90D0-707E4D805AE0}"/>
               </a:ext>
             </a:extLst>
           </p:cNvPr>
@@ -3967,8 +5185,8 @@
         </p:nvSpPr>
         <p:spPr>
           <a:xfrm>
-            <a:off x="1757934" y="1739360"/>
-            <a:ext cx="6094476" cy="1477328"/>
+            <a:off x="752475" y="1116287"/>
+            <a:ext cx="10448925" cy="923330"/>
           </a:xfrm>
           <a:prstGeom prst="rect">
             <a:avLst/>
@@ -3981,12 +5199,226 @@
           </a:bodyPr>
           <a:lstStyle/>
           <a:p>
-            <a:pPr marL="342900" indent="-342900">
-              <a:buFontTx/>
-              <a:buChar char="-"/>
-            </a:pPr>
-            <a:r>
-              <a:rPr lang="es-CO" sz="1800" dirty="0">
+            <a:pPr algn="just"/>
+            <a:r>
+              <a:rPr lang="en-US">
+                <a:solidFill>
+                  <a:schemeClr val="bg1"/>
+                </a:solidFill>
+              </a:rPr>
+              <a:t>The process of determining the causes of a set of observations is known as the inverse problem (Tarantola, 2005), aiming to infer, for example, the properties of a medium based on its reaction to mechanical wave propagation. </a:t>
+            </a:r>
+            <a:endParaRPr lang="es-CO">
+              <a:solidFill>
+                <a:schemeClr val="bg1"/>
+              </a:solidFill>
+            </a:endParaRPr>
+          </a:p>
+        </p:txBody>
+      </p:sp>
+      <p:sp>
+        <p:nvSpPr>
+          <p:cNvPr id="6" name="Rectángulo 5">
+            <a:extLst>
+              <a:ext uri="{FF2B5EF4-FFF2-40B4-BE49-F238E27FC236}">
+                <a16:creationId xmlns:a16="http://schemas.microsoft.com/office/drawing/2014/main" id="{B0E8069C-D6AF-FE2E-8A1A-970681F330D4}"/>
+              </a:ext>
+            </a:extLst>
+          </p:cNvPr>
+          <p:cNvSpPr/>
+          <p:nvPr/>
+        </p:nvSpPr>
+        <p:spPr>
+          <a:xfrm>
+            <a:off x="1990725" y="2675981"/>
+            <a:ext cx="7753349" cy="2725238"/>
+          </a:xfrm>
+          <a:prstGeom prst="rect">
+            <a:avLst/>
+          </a:prstGeom>
+          <a:solidFill>
+            <a:schemeClr val="bg1"/>
+          </a:solidFill>
+          <a:ln>
+            <a:noFill/>
+          </a:ln>
+        </p:spPr>
+        <p:style>
+          <a:lnRef idx="2">
+            <a:schemeClr val="accent1">
+              <a:shade val="15000"/>
+            </a:schemeClr>
+          </a:lnRef>
+          <a:fillRef idx="1">
+            <a:schemeClr val="accent1"/>
+          </a:fillRef>
+          <a:effectRef idx="0">
+            <a:schemeClr val="accent1"/>
+          </a:effectRef>
+          <a:fontRef idx="minor">
+            <a:schemeClr val="lt1"/>
+          </a:fontRef>
+        </p:style>
+        <p:txBody>
+          <a:bodyPr rtlCol="0" anchor="ctr"/>
+          <a:lstStyle/>
+          <a:p>
+            <a:pPr algn="ctr"/>
+            <a:endParaRPr lang="es-CO"/>
+          </a:p>
+        </p:txBody>
+      </p:sp>
+      <p:pic>
+        <p:nvPicPr>
+          <p:cNvPr id="5" name="Gráfico 4">
+            <a:extLst>
+              <a:ext uri="{FF2B5EF4-FFF2-40B4-BE49-F238E27FC236}">
+                <a16:creationId xmlns:a16="http://schemas.microsoft.com/office/drawing/2014/main" id="{A38B8CC5-FC92-F762-FBEB-4335E1F0FD02}"/>
+              </a:ext>
+            </a:extLst>
+          </p:cNvPr>
+          <p:cNvPicPr>
+            <a:picLocks noChangeAspect="1"/>
+          </p:cNvPicPr>
+          <p:nvPr/>
+        </p:nvPicPr>
+        <p:blipFill>
+          <a:blip r:embed="rId2">
+            <a:extLst>
+              <a:ext uri="{96DAC541-7B7A-43D3-8B79-37D633B846F1}">
+                <asvg:svgBlip xmlns:asvg="http://schemas.microsoft.com/office/drawing/2016/SVG/main" r:embed="rId3"/>
+              </a:ext>
+            </a:extLst>
+          </a:blip>
+          <a:stretch>
+            <a:fillRect/>
+          </a:stretch>
+        </p:blipFill>
+        <p:spPr>
+          <a:xfrm>
+            <a:off x="1652962" y="2843887"/>
+            <a:ext cx="8886076" cy="2389426"/>
+          </a:xfrm>
+          <a:prstGeom prst="rect">
+            <a:avLst/>
+          </a:prstGeom>
+        </p:spPr>
+      </p:pic>
+    </p:spTree>
+    <p:extLst>
+      <p:ext uri="{BB962C8B-B14F-4D97-AF65-F5344CB8AC3E}">
+        <p14:creationId xmlns:p14="http://schemas.microsoft.com/office/powerpoint/2010/main" val="3976370894"/>
+      </p:ext>
+    </p:extLst>
+  </p:cSld>
+  <p:clrMapOvr>
+    <a:masterClrMapping/>
+  </p:clrMapOvr>
+</p:sld>
+</file>
+
+<file path=ppt/slides/slide4.xml><?xml version="1.0" encoding="utf-8"?>
+<p:sld xmlns:a="http://schemas.openxmlformats.org/drawingml/2006/main" xmlns:r="http://schemas.openxmlformats.org/officeDocument/2006/relationships" xmlns:p="http://schemas.openxmlformats.org/presentationml/2006/main">
+  <p:cSld>
+    <p:spTree>
+      <p:nvGrpSpPr>
+        <p:cNvPr id="1" name=""/>
+        <p:cNvGrpSpPr/>
+        <p:nvPr/>
+      </p:nvGrpSpPr>
+      <p:grpSpPr>
+        <a:xfrm>
+          <a:off x="0" y="0"/>
+          <a:ext cx="0" cy="0"/>
+          <a:chOff x="0" y="0"/>
+          <a:chExt cx="0" cy="0"/>
+        </a:xfrm>
+      </p:grpSpPr>
+      <p:sp>
+        <p:nvSpPr>
+          <p:cNvPr id="2" name="Rectángulo 1">
+            <a:extLst>
+              <a:ext uri="{FF2B5EF4-FFF2-40B4-BE49-F238E27FC236}">
+                <a16:creationId xmlns:a16="http://schemas.microsoft.com/office/drawing/2014/main" id="{3405F8D3-8425-2526-113B-58DEA4170481}"/>
+              </a:ext>
+            </a:extLst>
+          </p:cNvPr>
+          <p:cNvSpPr/>
+          <p:nvPr/>
+        </p:nvSpPr>
+        <p:spPr>
+          <a:xfrm>
+            <a:off x="0" y="0"/>
+            <a:ext cx="12192000" cy="6858000"/>
+          </a:xfrm>
+          <a:prstGeom prst="rect">
+            <a:avLst/>
+          </a:prstGeom>
+          <a:solidFill>
+            <a:schemeClr val="accent1">
+              <a:lumMod val="75000"/>
+            </a:schemeClr>
+          </a:solidFill>
+          <a:ln>
+            <a:noFill/>
+          </a:ln>
+        </p:spPr>
+        <p:style>
+          <a:lnRef idx="2">
+            <a:schemeClr val="accent1">
+              <a:shade val="15000"/>
+            </a:schemeClr>
+          </a:lnRef>
+          <a:fillRef idx="1">
+            <a:schemeClr val="accent1"/>
+          </a:fillRef>
+          <a:effectRef idx="0">
+            <a:schemeClr val="accent1"/>
+          </a:effectRef>
+          <a:fontRef idx="minor">
+            <a:schemeClr val="lt1"/>
+          </a:fontRef>
+        </p:style>
+        <p:txBody>
+          <a:bodyPr rtlCol="0" anchor="ctr"/>
+          <a:lstStyle/>
+          <a:p>
+            <a:pPr algn="ctr"/>
+            <a:endParaRPr lang="es-CO"/>
+          </a:p>
+        </p:txBody>
+      </p:sp>
+      <p:sp>
+        <p:nvSpPr>
+          <p:cNvPr id="3" name="CuadroTexto 2">
+            <a:extLst>
+              <a:ext uri="{FF2B5EF4-FFF2-40B4-BE49-F238E27FC236}">
+                <a16:creationId xmlns:a16="http://schemas.microsoft.com/office/drawing/2014/main" id="{BDA77A03-7817-99E9-95F4-C31F632E1A3A}"/>
+              </a:ext>
+            </a:extLst>
+          </p:cNvPr>
+          <p:cNvSpPr txBox="1"/>
+          <p:nvPr/>
+        </p:nvSpPr>
+        <p:spPr>
+          <a:xfrm>
+            <a:off x="1524000" y="561975"/>
+            <a:ext cx="8839200" cy="461665"/>
+          </a:xfrm>
+          <a:prstGeom prst="rect">
+            <a:avLst/>
+          </a:prstGeom>
+          <a:noFill/>
+        </p:spPr>
+        <p:txBody>
+          <a:bodyPr wrap="square" rtlCol="0">
+            <a:spAutoFit/>
+          </a:bodyPr>
+          <a:lstStyle/>
+          <a:p>
+            <a:pPr algn="ctr"/>
+            <a:r>
+              <a:rPr lang="en-US" sz="2400" b="1">
                 <a:solidFill>
                   <a:schemeClr val="bg1"/>
                 </a:solidFill>
@@ -3994,11 +5426,9 @@
                 <a:ea typeface="Source Sans Pro" panose="020B0503030403020204" pitchFamily="34" charset="0"/>
                 <a:cs typeface="Arial" panose="020B0604020202020204" pitchFamily="34" charset="0"/>
               </a:rPr>
-              <a:t>Revisión de literatura</a:t>
-            </a:r>
-          </a:p>
-          <a:p>
-            <a:endParaRPr lang="es-CO" sz="1800" dirty="0">
+              <a:t>Machine learning Methods to solve Diferential Equations</a:t>
+            </a:r>
+            <a:endParaRPr lang="es-CO" sz="2400" b="1">
               <a:solidFill>
                 <a:schemeClr val="bg1"/>
               </a:solidFill>
@@ -4007,13 +5437,159 @@
               <a:cs typeface="Arial" panose="020B0604020202020204" pitchFamily="34" charset="0"/>
             </a:endParaRPr>
           </a:p>
-          <a:p>
-            <a:pPr marL="342900" indent="-342900">
-              <a:buFontTx/>
-              <a:buChar char="-"/>
-            </a:pPr>
-            <a:r>
-              <a:rPr lang="es-CO" sz="1800" dirty="0">
+        </p:txBody>
+      </p:sp>
+      <p:pic>
+        <p:nvPicPr>
+          <p:cNvPr id="9" name="Gráfico 8">
+            <a:extLst>
+              <a:ext uri="{FF2B5EF4-FFF2-40B4-BE49-F238E27FC236}">
+                <a16:creationId xmlns:a16="http://schemas.microsoft.com/office/drawing/2014/main" id="{C765EF87-CCAA-3EB8-63C6-FAD0231739B9}"/>
+              </a:ext>
+            </a:extLst>
+          </p:cNvPr>
+          <p:cNvPicPr>
+            <a:picLocks noChangeAspect="1"/>
+          </p:cNvPicPr>
+          <p:nvPr/>
+        </p:nvPicPr>
+        <p:blipFill>
+          <a:blip r:embed="rId2">
+            <a:extLst>
+              <a:ext uri="{96DAC541-7B7A-43D3-8B79-37D633B846F1}">
+                <asvg:svgBlip xmlns:asvg="http://schemas.microsoft.com/office/drawing/2016/SVG/main" r:embed="rId3"/>
+              </a:ext>
+            </a:extLst>
+          </a:blip>
+          <a:stretch>
+            <a:fillRect/>
+          </a:stretch>
+        </p:blipFill>
+        <p:spPr>
+          <a:xfrm>
+            <a:off x="1378176" y="2771774"/>
+            <a:ext cx="8834441" cy="2619376"/>
+          </a:xfrm>
+          <a:prstGeom prst="rect">
+            <a:avLst/>
+          </a:prstGeom>
+        </p:spPr>
+      </p:pic>
+    </p:spTree>
+    <p:extLst>
+      <p:ext uri="{BB962C8B-B14F-4D97-AF65-F5344CB8AC3E}">
+        <p14:creationId xmlns:p14="http://schemas.microsoft.com/office/powerpoint/2010/main" val="11445360"/>
+      </p:ext>
+    </p:extLst>
+  </p:cSld>
+  <p:clrMapOvr>
+    <a:masterClrMapping/>
+  </p:clrMapOvr>
+</p:sld>
+</file>
+
+<file path=ppt/slides/slide5.xml><?xml version="1.0" encoding="utf-8"?>
+<p:sld xmlns:a="http://schemas.openxmlformats.org/drawingml/2006/main" xmlns:r="http://schemas.openxmlformats.org/officeDocument/2006/relationships" xmlns:p="http://schemas.openxmlformats.org/presentationml/2006/main">
+  <p:cSld>
+    <p:spTree>
+      <p:nvGrpSpPr>
+        <p:cNvPr id="1" name=""/>
+        <p:cNvGrpSpPr/>
+        <p:nvPr/>
+      </p:nvGrpSpPr>
+      <p:grpSpPr>
+        <a:xfrm>
+          <a:off x="0" y="0"/>
+          <a:ext cx="0" cy="0"/>
+          <a:chOff x="0" y="0"/>
+          <a:chExt cx="0" cy="0"/>
+        </a:xfrm>
+      </p:grpSpPr>
+      <p:sp>
+        <p:nvSpPr>
+          <p:cNvPr id="2" name="Rectángulo 1">
+            <a:extLst>
+              <a:ext uri="{FF2B5EF4-FFF2-40B4-BE49-F238E27FC236}">
+                <a16:creationId xmlns:a16="http://schemas.microsoft.com/office/drawing/2014/main" id="{3405F8D3-8425-2526-113B-58DEA4170481}"/>
+              </a:ext>
+            </a:extLst>
+          </p:cNvPr>
+          <p:cNvSpPr/>
+          <p:nvPr/>
+        </p:nvSpPr>
+        <p:spPr>
+          <a:xfrm>
+            <a:off x="0" y="0"/>
+            <a:ext cx="12192000" cy="6858000"/>
+          </a:xfrm>
+          <a:prstGeom prst="rect">
+            <a:avLst/>
+          </a:prstGeom>
+          <a:solidFill>
+            <a:schemeClr val="accent1">
+              <a:lumMod val="75000"/>
+            </a:schemeClr>
+          </a:solidFill>
+          <a:ln>
+            <a:noFill/>
+          </a:ln>
+        </p:spPr>
+        <p:style>
+          <a:lnRef idx="2">
+            <a:schemeClr val="accent1">
+              <a:shade val="15000"/>
+            </a:schemeClr>
+          </a:lnRef>
+          <a:fillRef idx="1">
+            <a:schemeClr val="accent1"/>
+          </a:fillRef>
+          <a:effectRef idx="0">
+            <a:schemeClr val="accent1"/>
+          </a:effectRef>
+          <a:fontRef idx="minor">
+            <a:schemeClr val="lt1"/>
+          </a:fontRef>
+        </p:style>
+        <p:txBody>
+          <a:bodyPr rtlCol="0" anchor="ctr"/>
+          <a:lstStyle/>
+          <a:p>
+            <a:pPr algn="ctr"/>
+            <a:endParaRPr lang="es-CO"/>
+          </a:p>
+        </p:txBody>
+      </p:sp>
+      <p:sp>
+        <p:nvSpPr>
+          <p:cNvPr id="3" name="CuadroTexto 2">
+            <a:extLst>
+              <a:ext uri="{FF2B5EF4-FFF2-40B4-BE49-F238E27FC236}">
+                <a16:creationId xmlns:a16="http://schemas.microsoft.com/office/drawing/2014/main" id="{BDA77A03-7817-99E9-95F4-C31F632E1A3A}"/>
+              </a:ext>
+            </a:extLst>
+          </p:cNvPr>
+          <p:cNvSpPr txBox="1"/>
+          <p:nvPr/>
+        </p:nvSpPr>
+        <p:spPr>
+          <a:xfrm>
+            <a:off x="1772590" y="561975"/>
+            <a:ext cx="8342017" cy="461665"/>
+          </a:xfrm>
+          <a:prstGeom prst="rect">
+            <a:avLst/>
+          </a:prstGeom>
+          <a:noFill/>
+        </p:spPr>
+        <p:txBody>
+          <a:bodyPr wrap="square" rtlCol="0">
+            <a:spAutoFit/>
+          </a:bodyPr>
+          <a:lstStyle/>
+          <a:p>
+            <a:pPr algn="ctr"/>
+            <a:r>
+              <a:rPr lang="en-US" sz="2400" b="1">
                 <a:solidFill>
                   <a:schemeClr val="bg1"/>
                 </a:solidFill>
@@ -4021,11 +5597,9 @@
                 <a:ea typeface="Source Sans Pro" panose="020B0503030403020204" pitchFamily="34" charset="0"/>
                 <a:cs typeface="Arial" panose="020B0604020202020204" pitchFamily="34" charset="0"/>
               </a:rPr>
-              <a:t>Reproducción de Raissi et al. (2019)</a:t>
-            </a:r>
-          </a:p>
-          <a:p>
-            <a:endParaRPr lang="es-CO" sz="1800" dirty="0">
+              <a:t>Physics-informed neural networks</a:t>
+            </a:r>
+            <a:endParaRPr lang="es-CO" sz="2400" b="1">
               <a:solidFill>
                 <a:schemeClr val="bg1"/>
               </a:solidFill>
@@ -4034,13 +5608,159 @@
               <a:cs typeface="Arial" panose="020B0604020202020204" pitchFamily="34" charset="0"/>
             </a:endParaRPr>
           </a:p>
-          <a:p>
-            <a:pPr marL="342900" indent="-342900">
-              <a:buFontTx/>
-              <a:buChar char="-"/>
-            </a:pPr>
-            <a:r>
-              <a:rPr lang="es-CO" sz="1800" dirty="0">
+        </p:txBody>
+      </p:sp>
+      <p:pic>
+        <p:nvPicPr>
+          <p:cNvPr id="5" name="Gráfico 4">
+            <a:extLst>
+              <a:ext uri="{FF2B5EF4-FFF2-40B4-BE49-F238E27FC236}">
+                <a16:creationId xmlns:a16="http://schemas.microsoft.com/office/drawing/2014/main" id="{9632E97E-8EA7-9033-AA10-DC0DB673A68A}"/>
+              </a:ext>
+            </a:extLst>
+          </p:cNvPr>
+          <p:cNvPicPr>
+            <a:picLocks noChangeAspect="1"/>
+          </p:cNvPicPr>
+          <p:nvPr/>
+        </p:nvPicPr>
+        <p:blipFill>
+          <a:blip r:embed="rId2">
+            <a:extLst>
+              <a:ext uri="{96DAC541-7B7A-43D3-8B79-37D633B846F1}">
+                <asvg:svgBlip xmlns:asvg="http://schemas.microsoft.com/office/drawing/2016/SVG/main" r:embed="rId3"/>
+              </a:ext>
+            </a:extLst>
+          </a:blip>
+          <a:stretch>
+            <a:fillRect/>
+          </a:stretch>
+        </p:blipFill>
+        <p:spPr>
+          <a:xfrm>
+            <a:off x="1772592" y="1585615"/>
+            <a:ext cx="8342016" cy="4229100"/>
+          </a:xfrm>
+          <a:prstGeom prst="rect">
+            <a:avLst/>
+          </a:prstGeom>
+        </p:spPr>
+      </p:pic>
+    </p:spTree>
+    <p:extLst>
+      <p:ext uri="{BB962C8B-B14F-4D97-AF65-F5344CB8AC3E}">
+        <p14:creationId xmlns:p14="http://schemas.microsoft.com/office/powerpoint/2010/main" val="351438787"/>
+      </p:ext>
+    </p:extLst>
+  </p:cSld>
+  <p:clrMapOvr>
+    <a:masterClrMapping/>
+  </p:clrMapOvr>
+</p:sld>
+</file>
+
+<file path=ppt/slides/slide6.xml><?xml version="1.0" encoding="utf-8"?>
+<p:sld xmlns:a="http://schemas.openxmlformats.org/drawingml/2006/main" xmlns:r="http://schemas.openxmlformats.org/officeDocument/2006/relationships" xmlns:p="http://schemas.openxmlformats.org/presentationml/2006/main">
+  <p:cSld>
+    <p:spTree>
+      <p:nvGrpSpPr>
+        <p:cNvPr id="1" name=""/>
+        <p:cNvGrpSpPr/>
+        <p:nvPr/>
+      </p:nvGrpSpPr>
+      <p:grpSpPr>
+        <a:xfrm>
+          <a:off x="0" y="0"/>
+          <a:ext cx="0" cy="0"/>
+          <a:chOff x="0" y="0"/>
+          <a:chExt cx="0" cy="0"/>
+        </a:xfrm>
+      </p:grpSpPr>
+      <p:sp>
+        <p:nvSpPr>
+          <p:cNvPr id="2" name="Rectángulo 1">
+            <a:extLst>
+              <a:ext uri="{FF2B5EF4-FFF2-40B4-BE49-F238E27FC236}">
+                <a16:creationId xmlns:a16="http://schemas.microsoft.com/office/drawing/2014/main" id="{33B43DF0-55BF-79E0-2273-FD3CA4767423}"/>
+              </a:ext>
+            </a:extLst>
+          </p:cNvPr>
+          <p:cNvSpPr/>
+          <p:nvPr/>
+        </p:nvSpPr>
+        <p:spPr>
+          <a:xfrm>
+            <a:off x="0" y="0"/>
+            <a:ext cx="12192000" cy="6858000"/>
+          </a:xfrm>
+          <a:prstGeom prst="rect">
+            <a:avLst/>
+          </a:prstGeom>
+          <a:solidFill>
+            <a:schemeClr val="accent1">
+              <a:lumMod val="75000"/>
+            </a:schemeClr>
+          </a:solidFill>
+          <a:ln>
+            <a:noFill/>
+          </a:ln>
+        </p:spPr>
+        <p:style>
+          <a:lnRef idx="2">
+            <a:schemeClr val="accent1">
+              <a:shade val="15000"/>
+            </a:schemeClr>
+          </a:lnRef>
+          <a:fillRef idx="1">
+            <a:schemeClr val="accent1"/>
+          </a:fillRef>
+          <a:effectRef idx="0">
+            <a:schemeClr val="accent1"/>
+          </a:effectRef>
+          <a:fontRef idx="minor">
+            <a:schemeClr val="lt1"/>
+          </a:fontRef>
+        </p:style>
+        <p:txBody>
+          <a:bodyPr rtlCol="0" anchor="ctr"/>
+          <a:lstStyle/>
+          <a:p>
+            <a:pPr algn="ctr"/>
+            <a:endParaRPr lang="es-CO"/>
+          </a:p>
+        </p:txBody>
+      </p:sp>
+      <p:sp>
+        <p:nvSpPr>
+          <p:cNvPr id="3" name="CuadroTexto 2">
+            <a:extLst>
+              <a:ext uri="{FF2B5EF4-FFF2-40B4-BE49-F238E27FC236}">
+                <a16:creationId xmlns:a16="http://schemas.microsoft.com/office/drawing/2014/main" id="{254F0281-F108-BD43-3A10-671B6D0CB599}"/>
+              </a:ext>
+            </a:extLst>
+          </p:cNvPr>
+          <p:cNvSpPr txBox="1"/>
+          <p:nvPr/>
+        </p:nvSpPr>
+        <p:spPr>
+          <a:xfrm>
+            <a:off x="2520696" y="300433"/>
+            <a:ext cx="7150608" cy="461665"/>
+          </a:xfrm>
+          <a:prstGeom prst="rect">
+            <a:avLst/>
+          </a:prstGeom>
+          <a:noFill/>
+        </p:spPr>
+        <p:txBody>
+          <a:bodyPr wrap="square" rtlCol="0">
+            <a:spAutoFit/>
+          </a:bodyPr>
+          <a:lstStyle/>
+          <a:p>
+            <a:pPr algn="ctr"/>
+            <a:r>
+              <a:rPr lang="es-CO" sz="2400" b="1">
                 <a:solidFill>
                   <a:schemeClr val="bg1"/>
                 </a:solidFill>
@@ -4048,7 +5768,126 @@
                 <a:ea typeface="Source Sans Pro" panose="020B0503030403020204" pitchFamily="34" charset="0"/>
                 <a:cs typeface="Arial" panose="020B0604020202020204" pitchFamily="34" charset="0"/>
               </a:rPr>
-              <a:t>Planteamiento del problema</a:t>
+              <a:t>Raissi et al. (2019)</a:t>
+            </a:r>
+          </a:p>
+        </p:txBody>
+      </p:sp>
+      <p:pic>
+        <p:nvPicPr>
+          <p:cNvPr id="5" name="Imagen 4" descr="Interfaz de usuario gráfica, Gráfico, Diagrama&#10;&#10;Descripción generada automáticamente">
+            <a:extLst>
+              <a:ext uri="{FF2B5EF4-FFF2-40B4-BE49-F238E27FC236}">
+                <a16:creationId xmlns:a16="http://schemas.microsoft.com/office/drawing/2014/main" id="{D65CCECC-04E8-D4E6-730A-B2A198B58293}"/>
+              </a:ext>
+            </a:extLst>
+          </p:cNvPr>
+          <p:cNvPicPr>
+            <a:picLocks noChangeAspect="1"/>
+          </p:cNvPicPr>
+          <p:nvPr/>
+        </p:nvPicPr>
+        <p:blipFill>
+          <a:blip r:embed="rId3">
+            <a:extLst>
+              <a:ext uri="{28A0092B-C50C-407E-A947-70E740481C1C}">
+                <a14:useLocalDpi xmlns:a14="http://schemas.microsoft.com/office/drawing/2010/main" val="0"/>
+              </a:ext>
+            </a:extLst>
+          </a:blip>
+          <a:stretch>
+            <a:fillRect/>
+          </a:stretch>
+        </p:blipFill>
+        <p:spPr>
+          <a:xfrm>
+            <a:off x="6691093" y="2021951"/>
+            <a:ext cx="4900831" cy="2726892"/>
+          </a:xfrm>
+          <a:prstGeom prst="rect">
+            <a:avLst/>
+          </a:prstGeom>
+        </p:spPr>
+      </p:pic>
+      <p:sp>
+        <p:nvSpPr>
+          <p:cNvPr id="14" name="CuadroTexto 13">
+            <a:extLst>
+              <a:ext uri="{FF2B5EF4-FFF2-40B4-BE49-F238E27FC236}">
+                <a16:creationId xmlns:a16="http://schemas.microsoft.com/office/drawing/2014/main" id="{DAFA9663-830E-7BE6-4551-95B423A3AFCA}"/>
+              </a:ext>
+            </a:extLst>
+          </p:cNvPr>
+          <p:cNvSpPr txBox="1"/>
+          <p:nvPr/>
+        </p:nvSpPr>
+        <p:spPr>
+          <a:xfrm>
+            <a:off x="268197" y="6473279"/>
+            <a:ext cx="5227728" cy="338554"/>
+          </a:xfrm>
+          <a:prstGeom prst="rect">
+            <a:avLst/>
+          </a:prstGeom>
+          <a:noFill/>
+        </p:spPr>
+        <p:txBody>
+          <a:bodyPr wrap="square" rtlCol="0">
+            <a:spAutoFit/>
+          </a:bodyPr>
+          <a:lstStyle/>
+          <a:p>
+            <a:r>
+              <a:rPr lang="es-CO" sz="1600">
+                <a:solidFill>
+                  <a:schemeClr val="bg1"/>
+                </a:solidFill>
+                <a:latin typeface="Arial" panose="020B0604020202020204" pitchFamily="34" charset="0"/>
+                <a:ea typeface="Source Sans Pro" panose="020B0503030403020204" pitchFamily="34" charset="0"/>
+                <a:cs typeface="Arial" panose="020B0604020202020204" pitchFamily="34" charset="0"/>
+              </a:rPr>
+              <a:t>https://github.com/oscar-rincon/ReScience-PINNs</a:t>
+            </a:r>
+          </a:p>
+        </p:txBody>
+      </p:sp>
+      <p:sp>
+        <p:nvSpPr>
+          <p:cNvPr id="18" name="CuadroTexto 17">
+            <a:extLst>
+              <a:ext uri="{FF2B5EF4-FFF2-40B4-BE49-F238E27FC236}">
+                <a16:creationId xmlns:a16="http://schemas.microsoft.com/office/drawing/2014/main" id="{544D6CFF-490F-F937-B0AF-A56C0EBBB26A}"/>
+              </a:ext>
+            </a:extLst>
+          </p:cNvPr>
+          <p:cNvSpPr txBox="1"/>
+          <p:nvPr/>
+        </p:nvSpPr>
+        <p:spPr>
+          <a:xfrm>
+            <a:off x="4291013" y="762098"/>
+            <a:ext cx="3609974" cy="369332"/>
+          </a:xfrm>
+          <a:prstGeom prst="rect">
+            <a:avLst/>
+          </a:prstGeom>
+          <a:noFill/>
+        </p:spPr>
+        <p:txBody>
+          <a:bodyPr wrap="square" rtlCol="0">
+            <a:spAutoFit/>
+          </a:bodyPr>
+          <a:lstStyle/>
+          <a:p>
+            <a:r>
+              <a:rPr lang="es-CO" b="1">
+                <a:solidFill>
+                  <a:schemeClr val="bg1"/>
+                </a:solidFill>
+                <a:latin typeface="Arial" panose="020B0604020202020204" pitchFamily="34" charset="0"/>
+                <a:cs typeface="Arial" panose="020B0604020202020204" pitchFamily="34" charset="0"/>
+              </a:rPr>
+              <a:t>Continuous time identification</a:t>
             </a:r>
           </a:p>
         </p:txBody>
@@ -4056,7 +5895,748 @@
     </p:spTree>
     <p:extLst>
       <p:ext uri="{BB962C8B-B14F-4D97-AF65-F5344CB8AC3E}">
-        <p14:creationId xmlns:p14="http://schemas.microsoft.com/office/powerpoint/2010/main" val="1476158871"/>
+        <p14:creationId xmlns:p14="http://schemas.microsoft.com/office/powerpoint/2010/main" val="2477313963"/>
+      </p:ext>
+    </p:extLst>
+  </p:cSld>
+  <p:clrMapOvr>
+    <a:masterClrMapping/>
+  </p:clrMapOvr>
+</p:sld>
+</file>
+
+<file path=ppt/slides/slide7.xml><?xml version="1.0" encoding="utf-8"?>
+<p:sld xmlns:a="http://schemas.openxmlformats.org/drawingml/2006/main" xmlns:r="http://schemas.openxmlformats.org/officeDocument/2006/relationships" xmlns:p="http://schemas.openxmlformats.org/presentationml/2006/main">
+  <p:cSld>
+    <p:spTree>
+      <p:nvGrpSpPr>
+        <p:cNvPr id="1" name=""/>
+        <p:cNvGrpSpPr/>
+        <p:nvPr/>
+      </p:nvGrpSpPr>
+      <p:grpSpPr>
+        <a:xfrm>
+          <a:off x="0" y="0"/>
+          <a:ext cx="0" cy="0"/>
+          <a:chOff x="0" y="0"/>
+          <a:chExt cx="0" cy="0"/>
+        </a:xfrm>
+      </p:grpSpPr>
+      <p:sp>
+        <p:nvSpPr>
+          <p:cNvPr id="2" name="Rectángulo 1">
+            <a:extLst>
+              <a:ext uri="{FF2B5EF4-FFF2-40B4-BE49-F238E27FC236}">
+                <a16:creationId xmlns:a16="http://schemas.microsoft.com/office/drawing/2014/main" id="{33B43DF0-55BF-79E0-2273-FD3CA4767423}"/>
+              </a:ext>
+            </a:extLst>
+          </p:cNvPr>
+          <p:cNvSpPr/>
+          <p:nvPr/>
+        </p:nvSpPr>
+        <p:spPr>
+          <a:xfrm>
+            <a:off x="0" y="0"/>
+            <a:ext cx="12192000" cy="6858000"/>
+          </a:xfrm>
+          <a:prstGeom prst="rect">
+            <a:avLst/>
+          </a:prstGeom>
+          <a:solidFill>
+            <a:schemeClr val="accent1">
+              <a:lumMod val="75000"/>
+            </a:schemeClr>
+          </a:solidFill>
+          <a:ln>
+            <a:noFill/>
+          </a:ln>
+        </p:spPr>
+        <p:style>
+          <a:lnRef idx="2">
+            <a:schemeClr val="accent1">
+              <a:shade val="15000"/>
+            </a:schemeClr>
+          </a:lnRef>
+          <a:fillRef idx="1">
+            <a:schemeClr val="accent1"/>
+          </a:fillRef>
+          <a:effectRef idx="0">
+            <a:schemeClr val="accent1"/>
+          </a:effectRef>
+          <a:fontRef idx="minor">
+            <a:schemeClr val="lt1"/>
+          </a:fontRef>
+        </p:style>
+        <p:txBody>
+          <a:bodyPr rtlCol="0" anchor="ctr"/>
+          <a:lstStyle/>
+          <a:p>
+            <a:pPr algn="ctr"/>
+            <a:endParaRPr lang="es-CO"/>
+          </a:p>
+        </p:txBody>
+      </p:sp>
+      <p:sp>
+        <p:nvSpPr>
+          <p:cNvPr id="3" name="CuadroTexto 2">
+            <a:extLst>
+              <a:ext uri="{FF2B5EF4-FFF2-40B4-BE49-F238E27FC236}">
+                <a16:creationId xmlns:a16="http://schemas.microsoft.com/office/drawing/2014/main" id="{254F0281-F108-BD43-3A10-671B6D0CB599}"/>
+              </a:ext>
+            </a:extLst>
+          </p:cNvPr>
+          <p:cNvSpPr txBox="1"/>
+          <p:nvPr/>
+        </p:nvSpPr>
+        <p:spPr>
+          <a:xfrm>
+            <a:off x="2520696" y="300433"/>
+            <a:ext cx="7150608" cy="461665"/>
+          </a:xfrm>
+          <a:prstGeom prst="rect">
+            <a:avLst/>
+          </a:prstGeom>
+          <a:noFill/>
+        </p:spPr>
+        <p:txBody>
+          <a:bodyPr wrap="square" rtlCol="0">
+            <a:spAutoFit/>
+          </a:bodyPr>
+          <a:lstStyle/>
+          <a:p>
+            <a:pPr algn="ctr"/>
+            <a:r>
+              <a:rPr lang="es-CO" sz="2400" b="1">
+                <a:solidFill>
+                  <a:schemeClr val="bg1"/>
+                </a:solidFill>
+                <a:latin typeface="Arial" panose="020B0604020202020204" pitchFamily="34" charset="0"/>
+                <a:ea typeface="Source Sans Pro" panose="020B0503030403020204" pitchFamily="34" charset="0"/>
+                <a:cs typeface="Arial" panose="020B0604020202020204" pitchFamily="34" charset="0"/>
+              </a:rPr>
+              <a:t>Raissi et al. (2019)</a:t>
+            </a:r>
+          </a:p>
+        </p:txBody>
+      </p:sp>
+      <p:pic>
+        <p:nvPicPr>
+          <p:cNvPr id="9" name="Imagen 8" descr="Interfaz de usuario gráfica, Gráfico&#10;&#10;Descripción generada automáticamente">
+            <a:extLst>
+              <a:ext uri="{FF2B5EF4-FFF2-40B4-BE49-F238E27FC236}">
+                <a16:creationId xmlns:a16="http://schemas.microsoft.com/office/drawing/2014/main" id="{5F2BCF5D-D929-5E31-6D1E-059E877CE14B}"/>
+              </a:ext>
+            </a:extLst>
+          </p:cNvPr>
+          <p:cNvPicPr>
+            <a:picLocks noChangeAspect="1"/>
+          </p:cNvPicPr>
+          <p:nvPr/>
+        </p:nvPicPr>
+        <p:blipFill>
+          <a:blip r:embed="rId3">
+            <a:extLst>
+              <a:ext uri="{28A0092B-C50C-407E-A947-70E740481C1C}">
+                <a14:useLocalDpi xmlns:a14="http://schemas.microsoft.com/office/drawing/2010/main" val="0"/>
+              </a:ext>
+            </a:extLst>
+          </a:blip>
+          <a:stretch>
+            <a:fillRect/>
+          </a:stretch>
+        </p:blipFill>
+        <p:spPr>
+          <a:xfrm>
+            <a:off x="7053423" y="1726562"/>
+            <a:ext cx="4500402" cy="3782252"/>
+          </a:xfrm>
+          <a:prstGeom prst="rect">
+            <a:avLst/>
+          </a:prstGeom>
+        </p:spPr>
+      </p:pic>
+      <p:sp>
+        <p:nvSpPr>
+          <p:cNvPr id="14" name="CuadroTexto 13">
+            <a:extLst>
+              <a:ext uri="{FF2B5EF4-FFF2-40B4-BE49-F238E27FC236}">
+                <a16:creationId xmlns:a16="http://schemas.microsoft.com/office/drawing/2014/main" id="{DAFA9663-830E-7BE6-4551-95B423A3AFCA}"/>
+              </a:ext>
+            </a:extLst>
+          </p:cNvPr>
+          <p:cNvSpPr txBox="1"/>
+          <p:nvPr/>
+        </p:nvSpPr>
+        <p:spPr>
+          <a:xfrm>
+            <a:off x="268197" y="6473279"/>
+            <a:ext cx="5227728" cy="338554"/>
+          </a:xfrm>
+          <a:prstGeom prst="rect">
+            <a:avLst/>
+          </a:prstGeom>
+          <a:noFill/>
+        </p:spPr>
+        <p:txBody>
+          <a:bodyPr wrap="square" rtlCol="0">
+            <a:spAutoFit/>
+          </a:bodyPr>
+          <a:lstStyle/>
+          <a:p>
+            <a:r>
+              <a:rPr lang="es-CO" sz="1600">
+                <a:solidFill>
+                  <a:schemeClr val="bg1"/>
+                </a:solidFill>
+                <a:latin typeface="Arial" panose="020B0604020202020204" pitchFamily="34" charset="0"/>
+                <a:ea typeface="Source Sans Pro" panose="020B0503030403020204" pitchFamily="34" charset="0"/>
+                <a:cs typeface="Arial" panose="020B0604020202020204" pitchFamily="34" charset="0"/>
+              </a:rPr>
+              <a:t>https://github.com/oscar-rincon/ReScience-PINNs</a:t>
+            </a:r>
+          </a:p>
+        </p:txBody>
+      </p:sp>
+      <p:sp>
+        <p:nvSpPr>
+          <p:cNvPr id="21" name="CuadroTexto 20">
+            <a:extLst>
+              <a:ext uri="{FF2B5EF4-FFF2-40B4-BE49-F238E27FC236}">
+                <a16:creationId xmlns:a16="http://schemas.microsoft.com/office/drawing/2014/main" id="{7D83E3A4-B02D-BC94-4E49-07EACAD4A2DD}"/>
+              </a:ext>
+            </a:extLst>
+          </p:cNvPr>
+          <p:cNvSpPr txBox="1"/>
+          <p:nvPr/>
+        </p:nvSpPr>
+        <p:spPr>
+          <a:xfrm>
+            <a:off x="4067175" y="1029988"/>
+            <a:ext cx="4019550" cy="369332"/>
+          </a:xfrm>
+          <a:prstGeom prst="rect">
+            <a:avLst/>
+          </a:prstGeom>
+          <a:noFill/>
+        </p:spPr>
+        <p:txBody>
+          <a:bodyPr wrap="square" rtlCol="0">
+            <a:spAutoFit/>
+          </a:bodyPr>
+          <a:lstStyle/>
+          <a:p>
+            <a:pPr algn="ctr"/>
+            <a:r>
+              <a:rPr lang="es-CO" b="1">
+                <a:solidFill>
+                  <a:schemeClr val="bg1"/>
+                </a:solidFill>
+                <a:latin typeface="Arial" panose="020B0604020202020204" pitchFamily="34" charset="0"/>
+                <a:cs typeface="Arial" panose="020B0604020202020204" pitchFamily="34" charset="0"/>
+              </a:rPr>
+              <a:t>Discrete time inference</a:t>
+            </a:r>
+          </a:p>
+        </p:txBody>
+      </p:sp>
+    </p:spTree>
+    <p:extLst>
+      <p:ext uri="{BB962C8B-B14F-4D97-AF65-F5344CB8AC3E}">
+        <p14:creationId xmlns:p14="http://schemas.microsoft.com/office/powerpoint/2010/main" val="1277491028"/>
+      </p:ext>
+    </p:extLst>
+  </p:cSld>
+  <p:clrMapOvr>
+    <a:masterClrMapping/>
+  </p:clrMapOvr>
+</p:sld>
+</file>
+
+<file path=ppt/slides/slide8.xml><?xml version="1.0" encoding="utf-8"?>
+<p:sld xmlns:a="http://schemas.openxmlformats.org/drawingml/2006/main" xmlns:r="http://schemas.openxmlformats.org/officeDocument/2006/relationships" xmlns:p="http://schemas.openxmlformats.org/presentationml/2006/main">
+  <p:cSld>
+    <p:spTree>
+      <p:nvGrpSpPr>
+        <p:cNvPr id="1" name=""/>
+        <p:cNvGrpSpPr/>
+        <p:nvPr/>
+      </p:nvGrpSpPr>
+      <p:grpSpPr>
+        <a:xfrm>
+          <a:off x="0" y="0"/>
+          <a:ext cx="0" cy="0"/>
+          <a:chOff x="0" y="0"/>
+          <a:chExt cx="0" cy="0"/>
+        </a:xfrm>
+      </p:grpSpPr>
+      <p:sp>
+        <p:nvSpPr>
+          <p:cNvPr id="2" name="Rectángulo 1">
+            <a:extLst>
+              <a:ext uri="{FF2B5EF4-FFF2-40B4-BE49-F238E27FC236}">
+                <a16:creationId xmlns:a16="http://schemas.microsoft.com/office/drawing/2014/main" id="{33B43DF0-55BF-79E0-2273-FD3CA4767423}"/>
+              </a:ext>
+            </a:extLst>
+          </p:cNvPr>
+          <p:cNvSpPr/>
+          <p:nvPr/>
+        </p:nvSpPr>
+        <p:spPr>
+          <a:xfrm>
+            <a:off x="0" y="0"/>
+            <a:ext cx="12192000" cy="6858000"/>
+          </a:xfrm>
+          <a:prstGeom prst="rect">
+            <a:avLst/>
+          </a:prstGeom>
+          <a:solidFill>
+            <a:schemeClr val="accent1">
+              <a:lumMod val="75000"/>
+            </a:schemeClr>
+          </a:solidFill>
+          <a:ln>
+            <a:noFill/>
+          </a:ln>
+        </p:spPr>
+        <p:style>
+          <a:lnRef idx="2">
+            <a:schemeClr val="accent1">
+              <a:shade val="15000"/>
+            </a:schemeClr>
+          </a:lnRef>
+          <a:fillRef idx="1">
+            <a:schemeClr val="accent1"/>
+          </a:fillRef>
+          <a:effectRef idx="0">
+            <a:schemeClr val="accent1"/>
+          </a:effectRef>
+          <a:fontRef idx="minor">
+            <a:schemeClr val="lt1"/>
+          </a:fontRef>
+        </p:style>
+        <p:txBody>
+          <a:bodyPr rtlCol="0" anchor="ctr"/>
+          <a:lstStyle/>
+          <a:p>
+            <a:pPr algn="ctr"/>
+            <a:endParaRPr lang="es-CO"/>
+          </a:p>
+        </p:txBody>
+      </p:sp>
+      <p:sp>
+        <p:nvSpPr>
+          <p:cNvPr id="3" name="CuadroTexto 2">
+            <a:extLst>
+              <a:ext uri="{FF2B5EF4-FFF2-40B4-BE49-F238E27FC236}">
+                <a16:creationId xmlns:a16="http://schemas.microsoft.com/office/drawing/2014/main" id="{254F0281-F108-BD43-3A10-671B6D0CB599}"/>
+              </a:ext>
+            </a:extLst>
+          </p:cNvPr>
+          <p:cNvSpPr txBox="1"/>
+          <p:nvPr/>
+        </p:nvSpPr>
+        <p:spPr>
+          <a:xfrm>
+            <a:off x="2520696" y="300433"/>
+            <a:ext cx="7150608" cy="461665"/>
+          </a:xfrm>
+          <a:prstGeom prst="rect">
+            <a:avLst/>
+          </a:prstGeom>
+          <a:noFill/>
+        </p:spPr>
+        <p:txBody>
+          <a:bodyPr wrap="square" rtlCol="0">
+            <a:spAutoFit/>
+          </a:bodyPr>
+          <a:lstStyle/>
+          <a:p>
+            <a:pPr algn="ctr"/>
+            <a:r>
+              <a:rPr lang="es-CO" sz="2400" b="1">
+                <a:solidFill>
+                  <a:schemeClr val="bg1"/>
+                </a:solidFill>
+                <a:latin typeface="Arial" panose="020B0604020202020204" pitchFamily="34" charset="0"/>
+                <a:ea typeface="Source Sans Pro" panose="020B0503030403020204" pitchFamily="34" charset="0"/>
+                <a:cs typeface="Arial" panose="020B0604020202020204" pitchFamily="34" charset="0"/>
+              </a:rPr>
+              <a:t>Raissi et al. (2019)</a:t>
+            </a:r>
+          </a:p>
+        </p:txBody>
+      </p:sp>
+      <p:pic>
+        <p:nvPicPr>
+          <p:cNvPr id="7" name="Imagen 6" descr="Interfaz de usuario gráfica, Gráfico&#10;&#10;Descripción generada automáticamente">
+            <a:extLst>
+              <a:ext uri="{FF2B5EF4-FFF2-40B4-BE49-F238E27FC236}">
+                <a16:creationId xmlns:a16="http://schemas.microsoft.com/office/drawing/2014/main" id="{382565E3-9DF2-B471-A65B-0098D9AFF2FA}"/>
+              </a:ext>
+            </a:extLst>
+          </p:cNvPr>
+          <p:cNvPicPr>
+            <a:picLocks noChangeAspect="1"/>
+          </p:cNvPicPr>
+          <p:nvPr/>
+        </p:nvPicPr>
+        <p:blipFill>
+          <a:blip r:embed="rId3">
+            <a:extLst>
+              <a:ext uri="{28A0092B-C50C-407E-A947-70E740481C1C}">
+                <a14:useLocalDpi xmlns:a14="http://schemas.microsoft.com/office/drawing/2010/main" val="0"/>
+              </a:ext>
+            </a:extLst>
+          </a:blip>
+          <a:stretch>
+            <a:fillRect/>
+          </a:stretch>
+        </p:blipFill>
+        <p:spPr>
+          <a:xfrm>
+            <a:off x="6415620" y="2019300"/>
+            <a:ext cx="5157912" cy="2517665"/>
+          </a:xfrm>
+          <a:prstGeom prst="rect">
+            <a:avLst/>
+          </a:prstGeom>
+        </p:spPr>
+      </p:pic>
+      <p:sp>
+        <p:nvSpPr>
+          <p:cNvPr id="14" name="CuadroTexto 13">
+            <a:extLst>
+              <a:ext uri="{FF2B5EF4-FFF2-40B4-BE49-F238E27FC236}">
+                <a16:creationId xmlns:a16="http://schemas.microsoft.com/office/drawing/2014/main" id="{DAFA9663-830E-7BE6-4551-95B423A3AFCA}"/>
+              </a:ext>
+            </a:extLst>
+          </p:cNvPr>
+          <p:cNvSpPr txBox="1"/>
+          <p:nvPr/>
+        </p:nvSpPr>
+        <p:spPr>
+          <a:xfrm>
+            <a:off x="268197" y="6473279"/>
+            <a:ext cx="5227728" cy="369332"/>
+          </a:xfrm>
+          <a:prstGeom prst="rect">
+            <a:avLst/>
+          </a:prstGeom>
+          <a:noFill/>
+        </p:spPr>
+        <p:txBody>
+          <a:bodyPr wrap="square" rtlCol="0">
+            <a:spAutoFit/>
+          </a:bodyPr>
+          <a:lstStyle/>
+          <a:p>
+            <a:r>
+              <a:rPr lang="es-CO">
+                <a:solidFill>
+                  <a:schemeClr val="bg1"/>
+                </a:solidFill>
+                <a:latin typeface="Arial" panose="020B0604020202020204" pitchFamily="34" charset="0"/>
+                <a:ea typeface="Source Sans Pro" panose="020B0503030403020204" pitchFamily="34" charset="0"/>
+                <a:cs typeface="Arial" panose="020B0604020202020204" pitchFamily="34" charset="0"/>
+              </a:rPr>
+              <a:t>https://github.com/oscar-rincon/ReScience-PINNs</a:t>
+            </a:r>
+          </a:p>
+        </p:txBody>
+      </p:sp>
+      <p:sp>
+        <p:nvSpPr>
+          <p:cNvPr id="20" name="CuadroTexto 19">
+            <a:extLst>
+              <a:ext uri="{FF2B5EF4-FFF2-40B4-BE49-F238E27FC236}">
+                <a16:creationId xmlns:a16="http://schemas.microsoft.com/office/drawing/2014/main" id="{EFEB8EF5-3DCD-0074-D058-CF5D6FA76061}"/>
+              </a:ext>
+            </a:extLst>
+          </p:cNvPr>
+          <p:cNvSpPr txBox="1"/>
+          <p:nvPr/>
+        </p:nvSpPr>
+        <p:spPr>
+          <a:xfrm>
+            <a:off x="4531624" y="910376"/>
+            <a:ext cx="2953301" cy="369332"/>
+          </a:xfrm>
+          <a:prstGeom prst="rect">
+            <a:avLst/>
+          </a:prstGeom>
+          <a:noFill/>
+        </p:spPr>
+        <p:txBody>
+          <a:bodyPr wrap="square" rtlCol="0">
+            <a:spAutoFit/>
+          </a:bodyPr>
+          <a:lstStyle/>
+          <a:p>
+            <a:pPr algn="ctr"/>
+            <a:r>
+              <a:rPr lang="es-CO" b="1">
+                <a:solidFill>
+                  <a:schemeClr val="bg1"/>
+                </a:solidFill>
+                <a:latin typeface="Arial" panose="020B0604020202020204" pitchFamily="34" charset="0"/>
+                <a:cs typeface="Arial" panose="020B0604020202020204" pitchFamily="34" charset="0"/>
+              </a:rPr>
+              <a:t>Discrete time inference</a:t>
+            </a:r>
+          </a:p>
+        </p:txBody>
+      </p:sp>
+    </p:spTree>
+    <p:extLst>
+      <p:ext uri="{BB962C8B-B14F-4D97-AF65-F5344CB8AC3E}">
+        <p14:creationId xmlns:p14="http://schemas.microsoft.com/office/powerpoint/2010/main" val="2695735504"/>
+      </p:ext>
+    </p:extLst>
+  </p:cSld>
+  <p:clrMapOvr>
+    <a:masterClrMapping/>
+  </p:clrMapOvr>
+</p:sld>
+</file>
+
+<file path=ppt/slides/slide9.xml><?xml version="1.0" encoding="utf-8"?>
+<p:sld xmlns:a="http://schemas.openxmlformats.org/drawingml/2006/main" xmlns:r="http://schemas.openxmlformats.org/officeDocument/2006/relationships" xmlns:p="http://schemas.openxmlformats.org/presentationml/2006/main">
+  <p:cSld>
+    <p:spTree>
+      <p:nvGrpSpPr>
+        <p:cNvPr id="1" name=""/>
+        <p:cNvGrpSpPr/>
+        <p:nvPr/>
+      </p:nvGrpSpPr>
+      <p:grpSpPr>
+        <a:xfrm>
+          <a:off x="0" y="0"/>
+          <a:ext cx="0" cy="0"/>
+          <a:chOff x="0" y="0"/>
+          <a:chExt cx="0" cy="0"/>
+        </a:xfrm>
+      </p:grpSpPr>
+      <p:sp>
+        <p:nvSpPr>
+          <p:cNvPr id="2" name="Rectángulo 1">
+            <a:extLst>
+              <a:ext uri="{FF2B5EF4-FFF2-40B4-BE49-F238E27FC236}">
+                <a16:creationId xmlns:a16="http://schemas.microsoft.com/office/drawing/2014/main" id="{33B43DF0-55BF-79E0-2273-FD3CA4767423}"/>
+              </a:ext>
+            </a:extLst>
+          </p:cNvPr>
+          <p:cNvSpPr/>
+          <p:nvPr/>
+        </p:nvSpPr>
+        <p:spPr>
+          <a:xfrm>
+            <a:off x="0" y="0"/>
+            <a:ext cx="12192000" cy="6858000"/>
+          </a:xfrm>
+          <a:prstGeom prst="rect">
+            <a:avLst/>
+          </a:prstGeom>
+          <a:solidFill>
+            <a:schemeClr val="accent1">
+              <a:lumMod val="75000"/>
+            </a:schemeClr>
+          </a:solidFill>
+          <a:ln>
+            <a:noFill/>
+          </a:ln>
+        </p:spPr>
+        <p:style>
+          <a:lnRef idx="2">
+            <a:schemeClr val="accent1">
+              <a:shade val="15000"/>
+            </a:schemeClr>
+          </a:lnRef>
+          <a:fillRef idx="1">
+            <a:schemeClr val="accent1"/>
+          </a:fillRef>
+          <a:effectRef idx="0">
+            <a:schemeClr val="accent1"/>
+          </a:effectRef>
+          <a:fontRef idx="minor">
+            <a:schemeClr val="lt1"/>
+          </a:fontRef>
+        </p:style>
+        <p:txBody>
+          <a:bodyPr rtlCol="0" anchor="ctr"/>
+          <a:lstStyle/>
+          <a:p>
+            <a:pPr algn="ctr"/>
+            <a:endParaRPr lang="es-CO"/>
+          </a:p>
+        </p:txBody>
+      </p:sp>
+      <p:sp>
+        <p:nvSpPr>
+          <p:cNvPr id="3" name="CuadroTexto 2">
+            <a:extLst>
+              <a:ext uri="{FF2B5EF4-FFF2-40B4-BE49-F238E27FC236}">
+                <a16:creationId xmlns:a16="http://schemas.microsoft.com/office/drawing/2014/main" id="{254F0281-F108-BD43-3A10-671B6D0CB599}"/>
+              </a:ext>
+            </a:extLst>
+          </p:cNvPr>
+          <p:cNvSpPr txBox="1"/>
+          <p:nvPr/>
+        </p:nvSpPr>
+        <p:spPr>
+          <a:xfrm>
+            <a:off x="2520696" y="300433"/>
+            <a:ext cx="7150608" cy="461665"/>
+          </a:xfrm>
+          <a:prstGeom prst="rect">
+            <a:avLst/>
+          </a:prstGeom>
+          <a:noFill/>
+        </p:spPr>
+        <p:txBody>
+          <a:bodyPr wrap="square" rtlCol="0">
+            <a:spAutoFit/>
+          </a:bodyPr>
+          <a:lstStyle/>
+          <a:p>
+            <a:pPr algn="ctr"/>
+            <a:r>
+              <a:rPr lang="es-CO" sz="2400" b="1">
+                <a:solidFill>
+                  <a:schemeClr val="bg1"/>
+                </a:solidFill>
+                <a:latin typeface="Arial" panose="020B0604020202020204" pitchFamily="34" charset="0"/>
+                <a:ea typeface="Source Sans Pro" panose="020B0503030403020204" pitchFamily="34" charset="0"/>
+                <a:cs typeface="Arial" panose="020B0604020202020204" pitchFamily="34" charset="0"/>
+              </a:rPr>
+              <a:t>Raissi et al. (2019)</a:t>
+            </a:r>
+          </a:p>
+        </p:txBody>
+      </p:sp>
+      <p:pic>
+        <p:nvPicPr>
+          <p:cNvPr id="11" name="Imagen 10" descr="Interfaz de usuario gráfica, Gráfico&#10;&#10;Descripción generada automáticamente">
+            <a:extLst>
+              <a:ext uri="{FF2B5EF4-FFF2-40B4-BE49-F238E27FC236}">
+                <a16:creationId xmlns:a16="http://schemas.microsoft.com/office/drawing/2014/main" id="{961F5FC4-4FC9-CFD1-8B64-5CDDFA343736}"/>
+              </a:ext>
+            </a:extLst>
+          </p:cNvPr>
+          <p:cNvPicPr>
+            <a:picLocks noChangeAspect="1"/>
+          </p:cNvPicPr>
+          <p:nvPr/>
+        </p:nvPicPr>
+        <p:blipFill>
+          <a:blip r:embed="rId3">
+            <a:extLst>
+              <a:ext uri="{28A0092B-C50C-407E-A947-70E740481C1C}">
+                <a14:useLocalDpi xmlns:a14="http://schemas.microsoft.com/office/drawing/2010/main" val="0"/>
+              </a:ext>
+            </a:extLst>
+          </a:blip>
+          <a:stretch>
+            <a:fillRect/>
+          </a:stretch>
+        </p:blipFill>
+        <p:spPr>
+          <a:xfrm>
+            <a:off x="7362825" y="1686917"/>
+            <a:ext cx="3905250" cy="4161052"/>
+          </a:xfrm>
+          <a:prstGeom prst="rect">
+            <a:avLst/>
+          </a:prstGeom>
+        </p:spPr>
+      </p:pic>
+      <p:sp>
+        <p:nvSpPr>
+          <p:cNvPr id="14" name="CuadroTexto 13">
+            <a:extLst>
+              <a:ext uri="{FF2B5EF4-FFF2-40B4-BE49-F238E27FC236}">
+                <a16:creationId xmlns:a16="http://schemas.microsoft.com/office/drawing/2014/main" id="{DAFA9663-830E-7BE6-4551-95B423A3AFCA}"/>
+              </a:ext>
+            </a:extLst>
+          </p:cNvPr>
+          <p:cNvSpPr txBox="1"/>
+          <p:nvPr/>
+        </p:nvSpPr>
+        <p:spPr>
+          <a:xfrm>
+            <a:off x="268197" y="6473279"/>
+            <a:ext cx="5227728" cy="338554"/>
+          </a:xfrm>
+          <a:prstGeom prst="rect">
+            <a:avLst/>
+          </a:prstGeom>
+          <a:noFill/>
+        </p:spPr>
+        <p:txBody>
+          <a:bodyPr wrap="square" rtlCol="0">
+            <a:spAutoFit/>
+          </a:bodyPr>
+          <a:lstStyle/>
+          <a:p>
+            <a:r>
+              <a:rPr lang="es-CO" sz="1600">
+                <a:solidFill>
+                  <a:schemeClr val="bg1"/>
+                </a:solidFill>
+                <a:latin typeface="Arial" panose="020B0604020202020204" pitchFamily="34" charset="0"/>
+                <a:ea typeface="Source Sans Pro" panose="020B0503030403020204" pitchFamily="34" charset="0"/>
+                <a:cs typeface="Arial" panose="020B0604020202020204" pitchFamily="34" charset="0"/>
+              </a:rPr>
+              <a:t>https://github.com/oscar-rincon/ReScience-PINNs</a:t>
+            </a:r>
+          </a:p>
+        </p:txBody>
+      </p:sp>
+      <p:sp>
+        <p:nvSpPr>
+          <p:cNvPr id="19" name="CuadroTexto 18">
+            <a:extLst>
+              <a:ext uri="{FF2B5EF4-FFF2-40B4-BE49-F238E27FC236}">
+                <a16:creationId xmlns:a16="http://schemas.microsoft.com/office/drawing/2014/main" id="{10B90926-A640-2CE3-E012-B15F9A63E8C3}"/>
+              </a:ext>
+            </a:extLst>
+          </p:cNvPr>
+          <p:cNvSpPr txBox="1"/>
+          <p:nvPr/>
+        </p:nvSpPr>
+        <p:spPr>
+          <a:xfrm>
+            <a:off x="4210050" y="825365"/>
+            <a:ext cx="3638550" cy="369332"/>
+          </a:xfrm>
+          <a:prstGeom prst="rect">
+            <a:avLst/>
+          </a:prstGeom>
+          <a:noFill/>
+        </p:spPr>
+        <p:txBody>
+          <a:bodyPr wrap="square" rtlCol="0">
+            <a:spAutoFit/>
+          </a:bodyPr>
+          <a:lstStyle/>
+          <a:p>
+            <a:pPr algn="ctr"/>
+            <a:r>
+              <a:rPr lang="es-CO" b="1">
+                <a:solidFill>
+                  <a:schemeClr val="bg1"/>
+                </a:solidFill>
+                <a:latin typeface="Arial" panose="020B0604020202020204" pitchFamily="34" charset="0"/>
+                <a:cs typeface="Arial" panose="020B0604020202020204" pitchFamily="34" charset="0"/>
+              </a:rPr>
+              <a:t>Continuous time inference</a:t>
+            </a:r>
+          </a:p>
+        </p:txBody>
+      </p:sp>
+    </p:spTree>
+    <p:extLst>
+      <p:ext uri="{BB962C8B-B14F-4D97-AF65-F5344CB8AC3E}">
+        <p14:creationId xmlns:p14="http://schemas.microsoft.com/office/powerpoint/2010/main" val="2116195075"/>
       </p:ext>
     </p:extLst>
   </p:cSld>
@@ -4379,4 +6959,319 @@
     </a:ext>
   </a:extLst>
 </a:theme>
+</file>
+
+<file path=ppt/theme/theme2.xml><?xml version="1.0" encoding="utf-8"?>
+<a:theme xmlns:a="http://schemas.openxmlformats.org/drawingml/2006/main" name="Tema de Office">
+  <a:themeElements>
+    <a:clrScheme name="Office">
+      <a:dk1>
+        <a:sysClr val="windowText" lastClr="000000"/>
+      </a:dk1>
+      <a:lt1>
+        <a:sysClr val="window" lastClr="FFFFFF"/>
+      </a:lt1>
+      <a:dk2>
+        <a:srgbClr val="0E2841"/>
+      </a:dk2>
+      <a:lt2>
+        <a:srgbClr val="E8E8E8"/>
+      </a:lt2>
+      <a:accent1>
+        <a:srgbClr val="156082"/>
+      </a:accent1>
+      <a:accent2>
+        <a:srgbClr val="E97132"/>
+      </a:accent2>
+      <a:accent3>
+        <a:srgbClr val="196B24"/>
+      </a:accent3>
+      <a:accent4>
+        <a:srgbClr val="0F9ED5"/>
+      </a:accent4>
+      <a:accent5>
+        <a:srgbClr val="A02B93"/>
+      </a:accent5>
+      <a:accent6>
+        <a:srgbClr val="4EA72E"/>
+      </a:accent6>
+      <a:hlink>
+        <a:srgbClr val="467886"/>
+      </a:hlink>
+      <a:folHlink>
+        <a:srgbClr val="96607D"/>
+      </a:folHlink>
+    </a:clrScheme>
+    <a:fontScheme name="Office">
+      <a:majorFont>
+        <a:latin typeface="Aptos Display" panose="02110004020202020204"/>
+        <a:ea typeface=""/>
+        <a:cs typeface=""/>
+        <a:font script="Jpan" typeface="游ゴシック Light"/>
+        <a:font script="Hang" typeface="맑은 고딕"/>
+        <a:font script="Hans" typeface="等线 Light"/>
+        <a:font script="Hant" typeface="新細明體"/>
+        <a:font script="Arab" typeface="Times New Roman"/>
+        <a:font script="Hebr" typeface="Times New Roman"/>
+        <a:font script="Thai" typeface="Angsana New"/>
+        <a:font script="Ethi" typeface="Nyala"/>
+        <a:font script="Beng" typeface="Vrinda"/>
+        <a:font script="Gujr" typeface="Shruti"/>
+        <a:font script="Khmr" typeface="MoolBoran"/>
+        <a:font script="Knda" typeface="Tunga"/>
+        <a:font script="Guru" typeface="Raavi"/>
+        <a:font script="Cans" typeface="Euphemia"/>
+        <a:font script="Cher" typeface="Plantagenet Cherokee"/>
+        <a:font script="Yiii" typeface="Microsoft Yi Baiti"/>
+        <a:font script="Tibt" typeface="Microsoft Himalaya"/>
+        <a:font script="Thaa" typeface="MV Boli"/>
+        <a:font script="Deva" typeface="Mangal"/>
+        <a:font script="Telu" typeface="Gautami"/>
+        <a:font script="Taml" typeface="Latha"/>
+        <a:font script="Syrc" typeface="Estrangelo Edessa"/>
+        <a:font script="Orya" typeface="Kalinga"/>
+        <a:font script="Mlym" typeface="Kartika"/>
+        <a:font script="Laoo" typeface="DokChampa"/>
+        <a:font script="Sinh" typeface="Iskoola Pota"/>
+        <a:font script="Mong" typeface="Mongolian Baiti"/>
+        <a:font script="Viet" typeface="Times New Roman"/>
+        <a:font script="Uigh" typeface="Microsoft Uighur"/>
+        <a:font script="Geor" typeface="Sylfaen"/>
+        <a:font script="Armn" typeface="Arial"/>
+        <a:font script="Bugi" typeface="Leelawadee UI"/>
+        <a:font script="Bopo" typeface="Microsoft JhengHei"/>
+        <a:font script="Java" typeface="Javanese Text"/>
+        <a:font script="Lisu" typeface="Segoe UI"/>
+        <a:font script="Mymr" typeface="Myanmar Text"/>
+        <a:font script="Nkoo" typeface="Ebrima"/>
+        <a:font script="Olck" typeface="Nirmala UI"/>
+        <a:font script="Osma" typeface="Ebrima"/>
+        <a:font script="Phag" typeface="Phagspa"/>
+        <a:font script="Syrn" typeface="Estrangelo Edessa"/>
+        <a:font script="Syrj" typeface="Estrangelo Edessa"/>
+        <a:font script="Syre" typeface="Estrangelo Edessa"/>
+        <a:font script="Sora" typeface="Nirmala UI"/>
+        <a:font script="Tale" typeface="Microsoft Tai Le"/>
+        <a:font script="Talu" typeface="Microsoft New Tai Lue"/>
+        <a:font script="Tfng" typeface="Ebrima"/>
+      </a:majorFont>
+      <a:minorFont>
+        <a:latin typeface="Aptos" panose="02110004020202020204"/>
+        <a:ea typeface=""/>
+        <a:cs typeface=""/>
+        <a:font script="Jpan" typeface="游ゴシック"/>
+        <a:font script="Hang" typeface="맑은 고딕"/>
+        <a:font script="Hans" typeface="等线"/>
+        <a:font script="Hant" typeface="新細明體"/>
+        <a:font script="Arab" typeface="Arial"/>
+        <a:font script="Hebr" typeface="Arial"/>
+        <a:font script="Thai" typeface="Cordia New"/>
+        <a:font script="Ethi" typeface="Nyala"/>
+        <a:font script="Beng" typeface="Vrinda"/>
+        <a:font script="Gujr" typeface="Shruti"/>
+        <a:font script="Khmr" typeface="DaunPenh"/>
+        <a:font script="Knda" typeface="Tunga"/>
+        <a:font script="Guru" typeface="Raavi"/>
+        <a:font script="Cans" typeface="Euphemia"/>
+        <a:font script="Cher" typeface="Plantagenet Cherokee"/>
+        <a:font script="Yiii" typeface="Microsoft Yi Baiti"/>
+        <a:font script="Tibt" typeface="Microsoft Himalaya"/>
+        <a:font script="Thaa" typeface="MV Boli"/>
+        <a:font script="Deva" typeface="Mangal"/>
+        <a:font script="Telu" typeface="Gautami"/>
+        <a:font script="Taml" typeface="Latha"/>
+        <a:font script="Syrc" typeface="Estrangelo Edessa"/>
+        <a:font script="Orya" typeface="Kalinga"/>
+        <a:font script="Mlym" typeface="Kartika"/>
+        <a:font script="Laoo" typeface="DokChampa"/>
+        <a:font script="Sinh" typeface="Iskoola Pota"/>
+        <a:font script="Mong" typeface="Mongolian Baiti"/>
+        <a:font script="Viet" typeface="Arial"/>
+        <a:font script="Uigh" typeface="Microsoft Uighur"/>
+        <a:font script="Geor" typeface="Sylfaen"/>
+        <a:font script="Armn" typeface="Arial"/>
+        <a:font script="Bugi" typeface="Leelawadee UI"/>
+        <a:font script="Bopo" typeface="Microsoft JhengHei"/>
+        <a:font script="Java" typeface="Javanese Text"/>
+        <a:font script="Lisu" typeface="Segoe UI"/>
+        <a:font script="Mymr" typeface="Myanmar Text"/>
+        <a:font script="Nkoo" typeface="Ebrima"/>
+        <a:font script="Olck" typeface="Nirmala UI"/>
+        <a:font script="Osma" typeface="Ebrima"/>
+        <a:font script="Phag" typeface="Phagspa"/>
+        <a:font script="Syrn" typeface="Estrangelo Edessa"/>
+        <a:font script="Syrj" typeface="Estrangelo Edessa"/>
+        <a:font script="Syre" typeface="Estrangelo Edessa"/>
+        <a:font script="Sora" typeface="Nirmala UI"/>
+        <a:font script="Tale" typeface="Microsoft Tai Le"/>
+        <a:font script="Talu" typeface="Microsoft New Tai Lue"/>
+        <a:font script="Tfng" typeface="Ebrima"/>
+      </a:minorFont>
+    </a:fontScheme>
+    <a:fmtScheme name="Office">
+      <a:fillStyleLst>
+        <a:solidFill>
+          <a:schemeClr val="phClr"/>
+        </a:solidFill>
+        <a:gradFill rotWithShape="1">
+          <a:gsLst>
+            <a:gs pos="0">
+              <a:schemeClr val="phClr">
+                <a:lumMod val="110000"/>
+                <a:satMod val="105000"/>
+                <a:tint val="67000"/>
+              </a:schemeClr>
+            </a:gs>
+            <a:gs pos="50000">
+              <a:schemeClr val="phClr">
+                <a:lumMod val="105000"/>
+                <a:satMod val="103000"/>
+                <a:tint val="73000"/>
+              </a:schemeClr>
+            </a:gs>
+            <a:gs pos="100000">
+              <a:schemeClr val="phClr">
+                <a:lumMod val="105000"/>
+                <a:satMod val="109000"/>
+                <a:tint val="81000"/>
+              </a:schemeClr>
+            </a:gs>
+          </a:gsLst>
+          <a:lin ang="5400000" scaled="0"/>
+        </a:gradFill>
+        <a:gradFill rotWithShape="1">
+          <a:gsLst>
+            <a:gs pos="0">
+              <a:schemeClr val="phClr">
+                <a:satMod val="103000"/>
+                <a:lumMod val="102000"/>
+                <a:tint val="94000"/>
+              </a:schemeClr>
+            </a:gs>
+            <a:gs pos="50000">
+              <a:schemeClr val="phClr">
+                <a:satMod val="110000"/>
+                <a:lumMod val="100000"/>
+                <a:shade val="100000"/>
+              </a:schemeClr>
+            </a:gs>
+            <a:gs pos="100000">
+              <a:schemeClr val="phClr">
+                <a:lumMod val="99000"/>
+                <a:satMod val="120000"/>
+                <a:shade val="78000"/>
+              </a:schemeClr>
+            </a:gs>
+          </a:gsLst>
+          <a:lin ang="5400000" scaled="0"/>
+        </a:gradFill>
+      </a:fillStyleLst>
+      <a:lnStyleLst>
+        <a:ln w="12700" cap="flat" cmpd="sng" algn="ctr">
+          <a:solidFill>
+            <a:schemeClr val="phClr"/>
+          </a:solidFill>
+          <a:prstDash val="solid"/>
+          <a:miter lim="800000"/>
+        </a:ln>
+        <a:ln w="19050" cap="flat" cmpd="sng" algn="ctr">
+          <a:solidFill>
+            <a:schemeClr val="phClr"/>
+          </a:solidFill>
+          <a:prstDash val="solid"/>
+          <a:miter lim="800000"/>
+        </a:ln>
+        <a:ln w="25400" cap="flat" cmpd="sng" algn="ctr">
+          <a:solidFill>
+            <a:schemeClr val="phClr"/>
+          </a:solidFill>
+          <a:prstDash val="solid"/>
+          <a:miter lim="800000"/>
+        </a:ln>
+      </a:lnStyleLst>
+      <a:effectStyleLst>
+        <a:effectStyle>
+          <a:effectLst/>
+        </a:effectStyle>
+        <a:effectStyle>
+          <a:effectLst/>
+        </a:effectStyle>
+        <a:effectStyle>
+          <a:effectLst>
+            <a:outerShdw blurRad="57150" dist="19050" dir="5400000" algn="ctr" rotWithShape="0">
+              <a:srgbClr val="000000">
+                <a:alpha val="63000"/>
+              </a:srgbClr>
+            </a:outerShdw>
+          </a:effectLst>
+        </a:effectStyle>
+      </a:effectStyleLst>
+      <a:bgFillStyleLst>
+        <a:solidFill>
+          <a:schemeClr val="phClr"/>
+        </a:solidFill>
+        <a:solidFill>
+          <a:schemeClr val="phClr">
+            <a:tint val="95000"/>
+            <a:satMod val="170000"/>
+          </a:schemeClr>
+        </a:solidFill>
+        <a:gradFill rotWithShape="1">
+          <a:gsLst>
+            <a:gs pos="0">
+              <a:schemeClr val="phClr">
+                <a:tint val="93000"/>
+                <a:satMod val="150000"/>
+                <a:shade val="98000"/>
+                <a:lumMod val="102000"/>
+              </a:schemeClr>
+            </a:gs>
+            <a:gs pos="50000">
+              <a:schemeClr val="phClr">
+                <a:tint val="98000"/>
+                <a:satMod val="130000"/>
+                <a:shade val="90000"/>
+                <a:lumMod val="103000"/>
+              </a:schemeClr>
+            </a:gs>
+            <a:gs pos="100000">
+              <a:schemeClr val="phClr">
+                <a:shade val="63000"/>
+                <a:satMod val="120000"/>
+              </a:schemeClr>
+            </a:gs>
+          </a:gsLst>
+          <a:lin ang="5400000" scaled="0"/>
+        </a:gradFill>
+      </a:bgFillStyleLst>
+    </a:fmtScheme>
+  </a:themeElements>
+  <a:objectDefaults>
+    <a:lnDef>
+      <a:spPr/>
+      <a:bodyPr/>
+      <a:lstStyle/>
+      <a:style>
+        <a:lnRef idx="2">
+          <a:schemeClr val="accent1"/>
+        </a:lnRef>
+        <a:fillRef idx="0">
+          <a:schemeClr val="accent1"/>
+        </a:fillRef>
+        <a:effectRef idx="1">
+          <a:schemeClr val="accent1"/>
+        </a:effectRef>
+        <a:fontRef idx="minor">
+          <a:schemeClr val="tx1"/>
+        </a:fontRef>
+      </a:style>
+    </a:lnDef>
+  </a:objectDefaults>
+  <a:extraClrSchemeLst/>
+  <a:extLst>
+    <a:ext uri="{05A4C25C-085E-4340-85A3-A5531E510DB2}">
+      <thm15:themeFamily xmlns:thm15="http://schemas.microsoft.com/office/thememl/2012/main" name="Office Theme" id="{2E142A2C-CD16-42D6-873A-C26D2A0506FA}" vid="{1BDDFF52-6CD6-40A5-AB3C-68EB2F1E4D0A}"/>
+    </a:ext>
+  </a:extLst>
+</a:theme>
 </file>
</xml_diff>